<commit_message>
current state of pptx
</commit_message>
<xml_diff>
--- a/artifacts/devballers_final.pptx
+++ b/artifacts/devballers_final.pptx
@@ -5,18 +5,16 @@
     <p:sldMasterId id="2147483648" r:id="rId1"/>
   </p:sldMasterIdLst>
   <p:notesMasterIdLst>
-    <p:notesMasterId r:id="rId8"/>
+    <p:notesMasterId r:id="rId6"/>
   </p:notesMasterIdLst>
   <p:handoutMasterIdLst>
-    <p:handoutMasterId r:id="rId9"/>
+    <p:handoutMasterId r:id="rId7"/>
   </p:handoutMasterIdLst>
   <p:sldIdLst>
     <p:sldId id="262" r:id="rId2"/>
-    <p:sldId id="257" r:id="rId3"/>
-    <p:sldId id="260" r:id="rId4"/>
-    <p:sldId id="261" r:id="rId5"/>
-    <p:sldId id="258" r:id="rId6"/>
-    <p:sldId id="259" r:id="rId7"/>
+    <p:sldId id="265" r:id="rId3"/>
+    <p:sldId id="264" r:id="rId4"/>
+    <p:sldId id="263" r:id="rId5"/>
   </p:sldIdLst>
   <p:sldSz cx="12192000" cy="6858000"/>
   <p:notesSz cx="6858000" cy="9144000"/>
@@ -208,7 +206,7 @@
           <a:p>
             <a:fld id="{E6791462-BE13-41FD-BF22-7B45672A69EA}" type="datetimeFigureOut">
               <a:rPr lang="en-US" smtClean="0"/>
-              <a:t>11/27/2024</a:t>
+              <a:t>1/27/2025</a:t>
             </a:fld>
             <a:endParaRPr lang="en-US"/>
           </a:p>
@@ -274,7 +272,7 @@
           <a:p>
             <a:fld id="{1B5D193F-73ED-4D3E-BF58-F02534D9AC39}" type="slidenum">
               <a:rPr lang="en-US" smtClean="0"/>
-              <a:t>‹#›</a:t>
+              <a:t>‹Nr.›</a:t>
             </a:fld>
             <a:endParaRPr lang="en-US"/>
           </a:p>
@@ -373,7 +371,7 @@
           <a:p>
             <a:fld id="{C79E5134-0E51-4470-806B-86E1EBBDC0A1}" type="datetimeFigureOut">
               <a:rPr lang="en-US" smtClean="0"/>
-              <a:t>11/27/2024</a:t>
+              <a:t>1/27/2025</a:t>
             </a:fld>
             <a:endParaRPr lang="en-US"/>
           </a:p>
@@ -531,7 +529,7 @@
           <a:p>
             <a:fld id="{97C875EC-2782-47E9-B4B9-EE995BFD9A80}" type="slidenum">
               <a:rPr lang="en-US" smtClean="0"/>
-              <a:t>‹#›</a:t>
+              <a:t>‹Nr.›</a:t>
             </a:fld>
             <a:endParaRPr lang="en-US"/>
           </a:p>
@@ -5829,9 +5827,22 @@
           <a:lstStyle/>
           <a:p>
             <a:r>
-              <a:rPr lang="en-US"/>
-              <a:t>Assignment # (if any) - Topic - Group name</a:t>
+              <a:rPr lang="en-US" dirty="0"/>
+              <a:t>Final Product Presentation - </a:t>
             </a:r>
+            <a:r>
+              <a:rPr lang="en-US" dirty="0" err="1"/>
+              <a:t>LearnStack</a:t>
+            </a:r>
+            <a:r>
+              <a:rPr lang="en-US" dirty="0"/>
+              <a:t> - </a:t>
+            </a:r>
+            <a:r>
+              <a:rPr lang="en-US" dirty="0" err="1"/>
+              <a:t>DevBallers</a:t>
+            </a:r>
+            <a:endParaRPr lang="en-US" dirty="0"/>
           </a:p>
         </p:txBody>
       </p:sp>
@@ -5852,7 +5863,7 @@
           <a:p>
             <a:fld id="{E32A53FC-A1F5-4D9E-915D-C1AF2CE43DED}" type="slidenum">
               <a:rPr lang="en-US" smtClean="0"/>
-              <a:t>‹#›</a:t>
+              <a:t>‹Nr.›</a:t>
             </a:fld>
             <a:endParaRPr lang="en-US"/>
           </a:p>
@@ -6059,9 +6070,22 @@
           <a:lstStyle/>
           <a:p>
             <a:r>
-              <a:rPr lang="en-US"/>
-              <a:t>Assignment # (if any) - Topic - Group name</a:t>
+              <a:rPr lang="en-US" dirty="0"/>
+              <a:t>Final Product Presentation - </a:t>
             </a:r>
+            <a:r>
+              <a:rPr lang="en-US" dirty="0" err="1"/>
+              <a:t>LearnStack</a:t>
+            </a:r>
+            <a:r>
+              <a:rPr lang="en-US" dirty="0"/>
+              <a:t> - </a:t>
+            </a:r>
+            <a:r>
+              <a:rPr lang="en-US" dirty="0" err="1"/>
+              <a:t>DevBallers</a:t>
+            </a:r>
+            <a:endParaRPr lang="en-US" dirty="0"/>
           </a:p>
         </p:txBody>
       </p:sp>
@@ -6082,7 +6106,7 @@
           <a:p>
             <a:fld id="{E32A53FC-A1F5-4D9E-915D-C1AF2CE43DED}" type="slidenum">
               <a:rPr lang="en-US" smtClean="0"/>
-              <a:t>‹#›</a:t>
+              <a:t>‹Nr.›</a:t>
             </a:fld>
             <a:endParaRPr lang="en-US"/>
           </a:p>
@@ -11080,9 +11104,22 @@
           <a:lstStyle/>
           <a:p>
             <a:r>
-              <a:rPr lang="en-US"/>
-              <a:t>Assignment # (if any) - Topic - Group name</a:t>
+              <a:rPr lang="en-US" dirty="0"/>
+              <a:t>Final Product Presentation - </a:t>
             </a:r>
+            <a:r>
+              <a:rPr lang="en-US" dirty="0" err="1"/>
+              <a:t>LearnStack</a:t>
+            </a:r>
+            <a:r>
+              <a:rPr lang="en-US" dirty="0"/>
+              <a:t> - </a:t>
+            </a:r>
+            <a:r>
+              <a:rPr lang="en-US" dirty="0" err="1"/>
+              <a:t>DevBallers</a:t>
+            </a:r>
+            <a:endParaRPr lang="en-US" dirty="0"/>
           </a:p>
         </p:txBody>
       </p:sp>
@@ -11103,7 +11140,7 @@
           <a:p>
             <a:fld id="{E32A53FC-A1F5-4D9E-915D-C1AF2CE43DED}" type="slidenum">
               <a:rPr lang="en-US" smtClean="0"/>
-              <a:t>‹#›</a:t>
+              <a:t>‹Nr.›</a:t>
             </a:fld>
             <a:endParaRPr lang="en-US"/>
           </a:p>
@@ -11186,9 +11223,22 @@
           <a:lstStyle/>
           <a:p>
             <a:r>
-              <a:rPr lang="en-US"/>
-              <a:t>Assignment # (if any) - Topic - Group name</a:t>
+              <a:rPr lang="en-US" dirty="0"/>
+              <a:t>Final Product Presentation - </a:t>
             </a:r>
+            <a:r>
+              <a:rPr lang="en-US" dirty="0" err="1"/>
+              <a:t>LearnStack</a:t>
+            </a:r>
+            <a:r>
+              <a:rPr lang="en-US" dirty="0"/>
+              <a:t> - </a:t>
+            </a:r>
+            <a:r>
+              <a:rPr lang="en-US" dirty="0" err="1"/>
+              <a:t>DevBallers</a:t>
+            </a:r>
+            <a:endParaRPr lang="en-US" dirty="0"/>
           </a:p>
         </p:txBody>
       </p:sp>
@@ -11209,7 +11259,7 @@
           <a:p>
             <a:fld id="{E32A53FC-A1F5-4D9E-915D-C1AF2CE43DED}" type="slidenum">
               <a:rPr lang="en-US" smtClean="0"/>
-              <a:t>‹#›</a:t>
+              <a:t>‹Nr.›</a:t>
             </a:fld>
             <a:endParaRPr lang="en-US"/>
           </a:p>
@@ -11261,9 +11311,22 @@
           <a:lstStyle/>
           <a:p>
             <a:r>
-              <a:rPr lang="en-US"/>
-              <a:t>Assignment # (if any) - Topic - Group name</a:t>
+              <a:rPr lang="en-US" dirty="0"/>
+              <a:t>Final Product Presentation - </a:t>
             </a:r>
+            <a:r>
+              <a:rPr lang="en-US" dirty="0" err="1"/>
+              <a:t>LearnStack</a:t>
+            </a:r>
+            <a:r>
+              <a:rPr lang="en-US" dirty="0"/>
+              <a:t> - </a:t>
+            </a:r>
+            <a:r>
+              <a:rPr lang="en-US" dirty="0" err="1"/>
+              <a:t>DevBallers</a:t>
+            </a:r>
+            <a:endParaRPr lang="en-US" dirty="0"/>
           </a:p>
         </p:txBody>
       </p:sp>
@@ -11284,7 +11347,7 @@
           <a:p>
             <a:fld id="{E32A53FC-A1F5-4D9E-915D-C1AF2CE43DED}" type="slidenum">
               <a:rPr lang="en-US" smtClean="0"/>
-              <a:t>‹#›</a:t>
+              <a:t>‹Nr.›</a:t>
             </a:fld>
             <a:endParaRPr lang="en-US"/>
           </a:p>
@@ -16245,8 +16308,20 @@
           </a:lstStyle>
           <a:p>
             <a:r>
-              <a:rPr lang="en-US"/>
-              <a:t>Assignment # (if any) - Topic - Group name</a:t>
+              <a:rPr lang="en-US" dirty="0"/>
+              <a:t>Final Product Presentation - </a:t>
+            </a:r>
+            <a:r>
+              <a:rPr lang="en-US" dirty="0" err="1"/>
+              <a:t>LearnStack</a:t>
+            </a:r>
+            <a:r>
+              <a:rPr lang="en-US" dirty="0"/>
+              <a:t> - </a:t>
+            </a:r>
+            <a:r>
+              <a:rPr lang="en-US" dirty="0" err="1"/>
+              <a:t>DevBallers</a:t>
             </a:r>
             <a:endParaRPr lang="en-US" dirty="0"/>
           </a:p>
@@ -16286,7 +16361,7 @@
             <a:fld id="{E32A53FC-A1F5-4D9E-915D-C1AF2CE43DED}" type="slidenum">
               <a:rPr lang="en-US" smtClean="0"/>
               <a:pPr/>
-              <a:t>‹#›</a:t>
+              <a:t>‹Nr.›</a:t>
             </a:fld>
             <a:endParaRPr lang="en-US" dirty="0"/>
           </a:p>
@@ -21407,7 +21482,17 @@
           <a:bodyPr/>
           <a:lstStyle/>
           <a:p>
-            <a:endParaRPr lang="en-US"/>
+            <a:r>
+              <a:rPr lang="en-US" b="1" dirty="0" err="1"/>
+              <a:t>LearnStack</a:t>
+            </a:r>
+            <a:br>
+              <a:rPr lang="en-US" b="1" dirty="0"/>
+            </a:br>
+            <a:r>
+              <a:rPr lang="en-US" sz="2800" dirty="0"/>
+              <a:t>Final Product Presentation</a:t>
+            </a:r>
           </a:p>
         </p:txBody>
       </p:sp>
@@ -21432,60 +21517,90 @@
           <a:bodyPr/>
           <a:lstStyle/>
           <a:p>
-            <a:endParaRPr lang="en-US" dirty="0"/>
+            <a:r>
+              <a:rPr lang="en-US" b="1" dirty="0" err="1"/>
+              <a:t>DevBallers</a:t>
+            </a:r>
+            <a:endParaRPr lang="en-US" b="1" dirty="0"/>
+          </a:p>
+          <a:p>
+            <a:r>
+              <a:rPr lang="en-US" dirty="0"/>
+              <a:t>Atilla Dogan, Oguzhan Kaluk</a:t>
+            </a:r>
           </a:p>
         </p:txBody>
       </p:sp>
-      <p:sp>
-        <p:nvSpPr>
-          <p:cNvPr id="8" name="Content Placeholder 7">
+      <p:pic>
+        <p:nvPicPr>
+          <p:cNvPr id="3" name="Inhaltsplatzhalter 2">
             <a:extLst>
               <a:ext uri="{FF2B5EF4-FFF2-40B4-BE49-F238E27FC236}">
-                <a16:creationId xmlns:a16="http://schemas.microsoft.com/office/drawing/2014/main" id="{BE456A47-2DF6-0792-740E-30267FD85B84}"/>
+                <a16:creationId xmlns:a16="http://schemas.microsoft.com/office/drawing/2014/main" id="{0EB8D709-CB12-0BE5-3A57-3CFC9F9BA483}"/>
               </a:ext>
             </a:extLst>
           </p:cNvPr>
-          <p:cNvSpPr>
-            <a:spLocks noGrp="1"/>
-          </p:cNvSpPr>
+          <p:cNvPicPr>
+            <a:picLocks noGrp="1" noChangeAspect="1"/>
+          </p:cNvPicPr>
           <p:nvPr>
             <p:ph idx="10"/>
           </p:nvPr>
-        </p:nvSpPr>
-        <p:spPr/>
-        <p:txBody>
-          <a:bodyPr/>
-          <a:lstStyle/>
-          <a:p>
-            <a:endParaRPr lang="en-US"/>
-          </a:p>
-        </p:txBody>
-      </p:sp>
-      <p:sp>
-        <p:nvSpPr>
-          <p:cNvPr id="9" name="Content Placeholder 8">
+        </p:nvPicPr>
+        <p:blipFill>
+          <a:blip r:embed="rId2">
+            <a:extLst>
+              <a:ext uri="{96DAC541-7B7A-43D3-8B79-37D633B846F1}">
+                <asvg:svgBlip xmlns:asvg="http://schemas.microsoft.com/office/drawing/2016/SVG/main" r:embed="rId3"/>
+              </a:ext>
+            </a:extLst>
+          </a:blip>
+          <a:stretch>
+            <a:fillRect/>
+          </a:stretch>
+        </p:blipFill>
+        <p:spPr>
+          <a:xfrm>
+            <a:off x="1561306" y="2170113"/>
+            <a:ext cx="2387600" cy="2387600"/>
+          </a:xfrm>
+        </p:spPr>
+      </p:pic>
+      <p:pic>
+        <p:nvPicPr>
+          <p:cNvPr id="5" name="Inhaltsplatzhalter 4" descr="Ein Bild, das Kreis, Logo, Symbol, Markenzeichen enthält.&#10;&#10;Automatisch generierte Beschreibung">
             <a:extLst>
               <a:ext uri="{FF2B5EF4-FFF2-40B4-BE49-F238E27FC236}">
-                <a16:creationId xmlns:a16="http://schemas.microsoft.com/office/drawing/2014/main" id="{1CDA4C1A-CE80-6237-C311-056732DCEC47}"/>
+                <a16:creationId xmlns:a16="http://schemas.microsoft.com/office/drawing/2014/main" id="{07E29916-074B-EFF7-9C5B-B05CC2710DEF}"/>
               </a:ext>
             </a:extLst>
           </p:cNvPr>
-          <p:cNvSpPr>
-            <a:spLocks noGrp="1"/>
-          </p:cNvSpPr>
+          <p:cNvPicPr>
+            <a:picLocks noGrp="1" noChangeAspect="1"/>
+          </p:cNvPicPr>
           <p:nvPr>
             <p:ph idx="11"/>
           </p:nvPr>
-        </p:nvSpPr>
-        <p:spPr/>
-        <p:txBody>
-          <a:bodyPr/>
-          <a:lstStyle/>
-          <a:p>
-            <a:endParaRPr lang="en-US"/>
-          </a:p>
-        </p:txBody>
-      </p:sp>
+        </p:nvPicPr>
+        <p:blipFill>
+          <a:blip r:embed="rId4">
+            <a:extLst>
+              <a:ext uri="{28A0092B-C50C-407E-A947-70E740481C1C}">
+                <a14:useLocalDpi xmlns:a14="http://schemas.microsoft.com/office/drawing/2010/main" val="0"/>
+              </a:ext>
+            </a:extLst>
+          </a:blip>
+          <a:stretch>
+            <a:fillRect/>
+          </a:stretch>
+        </p:blipFill>
+        <p:spPr>
+          <a:xfrm>
+            <a:off x="1550193" y="4711700"/>
+            <a:ext cx="1655763" cy="1655763"/>
+          </a:xfrm>
+        </p:spPr>
+      </p:pic>
     </p:spTree>
     <p:extLst>
       <p:ext uri="{BB962C8B-B14F-4D97-AF65-F5344CB8AC3E}">
@@ -21500,7 +21615,7 @@
 </file>
 
 <file path=ppt/slides/slide2.xml><?xml version="1.0" encoding="utf-8"?>
-<p:sld xmlns:a="http://schemas.openxmlformats.org/drawingml/2006/main" xmlns:r="http://schemas.openxmlformats.org/officeDocument/2006/relationships" xmlns:p="http://schemas.openxmlformats.org/presentationml/2006/main" show="0">
+<p:sld xmlns:a="http://schemas.openxmlformats.org/drawingml/2006/main" xmlns:r="http://schemas.openxmlformats.org/officeDocument/2006/relationships" xmlns:p="http://schemas.openxmlformats.org/presentationml/2006/main">
   <p:cSld>
     <p:spTree>
       <p:nvGrpSpPr>
@@ -21518,10 +21633,10 @@
       </p:grpSpPr>
       <p:sp>
         <p:nvSpPr>
-          <p:cNvPr id="2" name="Title 1">
+          <p:cNvPr id="2" name="Titel 1">
             <a:extLst>
               <a:ext uri="{FF2B5EF4-FFF2-40B4-BE49-F238E27FC236}">
-                <a16:creationId xmlns:a16="http://schemas.microsoft.com/office/drawing/2014/main" id="{F02D5A5A-67AD-4B19-8A1E-A06DB01026B1}"/>
+                <a16:creationId xmlns:a16="http://schemas.microsoft.com/office/drawing/2014/main" id="{02B3DE73-1E60-3554-08C7-31ABA1242C6A}"/>
               </a:ext>
             </a:extLst>
           </p:cNvPr>
@@ -21538,18 +21653,18 @@
           <a:lstStyle/>
           <a:p>
             <a:r>
-              <a:rPr lang="en-US" dirty="0"/>
-              <a:t>Guidelines for Good Presentation Slides</a:t>
+              <a:rPr lang="de-DE" dirty="0"/>
+              <a:t>Project Idea</a:t>
             </a:r>
           </a:p>
         </p:txBody>
       </p:sp>
       <p:sp>
         <p:nvSpPr>
-          <p:cNvPr id="3" name="Content Placeholder 2">
+          <p:cNvPr id="3" name="Inhaltsplatzhalter 2">
             <a:extLst>
               <a:ext uri="{FF2B5EF4-FFF2-40B4-BE49-F238E27FC236}">
-                <a16:creationId xmlns:a16="http://schemas.microsoft.com/office/drawing/2014/main" id="{E2E21AD8-3CAD-44FA-A319-005CAE279D83}"/>
+                <a16:creationId xmlns:a16="http://schemas.microsoft.com/office/drawing/2014/main" id="{0BF88B00-D72A-C2A5-B088-53107FAEEC4A}"/>
               </a:ext>
             </a:extLst>
           </p:cNvPr>
@@ -21557,218 +21672,135 @@
             <a:spLocks noGrp="1"/>
           </p:cNvSpPr>
           <p:nvPr>
-            <p:ph idx="1"/>
+            <p:ph sz="half" idx="1"/>
           </p:nvPr>
         </p:nvSpPr>
         <p:spPr/>
         <p:txBody>
-          <a:bodyPr>
-            <a:normAutofit fontScale="70000" lnSpcReduction="20000"/>
-          </a:bodyPr>
+          <a:bodyPr/>
           <a:lstStyle/>
           <a:p>
+            <a:pPr marL="0" indent="0">
+              <a:buNone/>
+            </a:pPr>
             <a:r>
-              <a:rPr lang="en-US" dirty="0"/>
-              <a:t>Footer should consist of the topic and group name separated by a hyphen</a:t>
+              <a:rPr lang="de-DE" dirty="0" err="1"/>
+              <a:t>Anki</a:t>
             </a:r>
-          </a:p>
-          <a:p>
-            <a:pPr lvl="1"/>
-            <a:r>
-              <a:rPr lang="en-US" dirty="0"/>
-              <a:t>From the top menu, click </a:t>
-            </a:r>
-            <a:r>
-              <a:rPr lang="en-US" i="1" dirty="0"/>
-              <a:t>Insert</a:t>
-            </a:r>
-            <a:r>
-              <a:rPr lang="en-US" dirty="0"/>
-              <a:t> menu </a:t>
-            </a:r>
-            <a:r>
-              <a:rPr lang="en-US" dirty="0">
-                <a:sym typeface="Wingdings" panose="05000000000000000000" pitchFamily="2" charset="2"/>
-              </a:rPr>
-              <a:t> under </a:t>
-            </a:r>
-            <a:r>
-              <a:rPr lang="en-US" i="1" dirty="0">
-                <a:sym typeface="Wingdings" panose="05000000000000000000" pitchFamily="2" charset="2"/>
-              </a:rPr>
-              <a:t>Text</a:t>
-            </a:r>
-            <a:r>
-              <a:rPr lang="en-US" dirty="0">
-                <a:sym typeface="Wingdings" panose="05000000000000000000" pitchFamily="2" charset="2"/>
-              </a:rPr>
-              <a:t> category click </a:t>
-            </a:r>
-            <a:r>
-              <a:rPr lang="en-US" i="1" dirty="0">
-                <a:sym typeface="Wingdings" panose="05000000000000000000" pitchFamily="2" charset="2"/>
-              </a:rPr>
-              <a:t>Header &amp; Footer</a:t>
-            </a:r>
-            <a:r>
-              <a:rPr lang="en-US" dirty="0">
-                <a:sym typeface="Wingdings" panose="05000000000000000000" pitchFamily="2" charset="2"/>
-              </a:rPr>
-              <a:t>  check </a:t>
-            </a:r>
-            <a:r>
-              <a:rPr lang="en-US" i="1" dirty="0">
-                <a:sym typeface="Wingdings" panose="05000000000000000000" pitchFamily="2" charset="2"/>
-              </a:rPr>
-              <a:t>Slide number</a:t>
-            </a:r>
-            <a:r>
-              <a:rPr lang="en-US" dirty="0">
-                <a:sym typeface="Wingdings" panose="05000000000000000000" pitchFamily="2" charset="2"/>
-              </a:rPr>
-              <a:t> and </a:t>
-            </a:r>
-            <a:r>
-              <a:rPr lang="en-US" i="1" dirty="0">
-                <a:sym typeface="Wingdings" panose="05000000000000000000" pitchFamily="2" charset="2"/>
-              </a:rPr>
-              <a:t>Footer</a:t>
-            </a:r>
-            <a:endParaRPr lang="en-US" i="1" dirty="0"/>
-          </a:p>
-          <a:p>
-            <a:pPr lvl="1"/>
-            <a:r>
-              <a:rPr lang="en-US" dirty="0"/>
-              <a:t>E.g., Assignment 2 – Big Data Tools Presentation – MongoDB – Group 1</a:t>
-            </a:r>
+            <a:endParaRPr lang="de-DE" dirty="0"/>
           </a:p>
           <a:p>
             <a:r>
-              <a:rPr lang="en-US"/>
-              <a:t>Provide </a:t>
+              <a:rPr lang="de-DE" sz="2400" dirty="0"/>
+              <a:t>Deck </a:t>
             </a:r>
             <a:r>
-              <a:rPr lang="en-US" dirty="0"/>
-              <a:t>slide numbers</a:t>
+              <a:rPr lang="de-DE" sz="2400" dirty="0" err="1"/>
+              <a:t>management</a:t>
             </a:r>
+            <a:endParaRPr lang="de-DE" sz="2400" dirty="0"/>
           </a:p>
           <a:p>
             <a:r>
-              <a:rPr lang="en-US" dirty="0"/>
-              <a:t>Use different layouts</a:t>
+              <a:rPr lang="de-DE" sz="2400" dirty="0"/>
+              <a:t>Flash </a:t>
             </a:r>
-          </a:p>
-          <a:p>
-            <a:pPr lvl="1"/>
             <a:r>
-              <a:rPr lang="en-US" dirty="0"/>
-              <a:t>Right slide on a slide of your left panel</a:t>
+              <a:rPr lang="de-DE" sz="2400" dirty="0" err="1"/>
+              <a:t>card</a:t>
             </a:r>
-          </a:p>
-          <a:p>
-            <a:pPr lvl="1"/>
             <a:r>
-              <a:rPr lang="en-US" dirty="0"/>
-              <a:t>Open the “Layout” menu</a:t>
+              <a:rPr lang="de-DE" sz="2400" dirty="0"/>
+              <a:t> </a:t>
             </a:r>
-          </a:p>
-          <a:p>
-            <a:pPr lvl="1"/>
             <a:r>
-              <a:rPr lang="en-US" dirty="0"/>
-              <a:t>Select the appropriate layouts</a:t>
+              <a:rPr lang="de-DE" sz="2400" dirty="0" err="1"/>
+              <a:t>management</a:t>
             </a:r>
+            <a:endParaRPr lang="de-DE" sz="2400" dirty="0"/>
           </a:p>
           <a:p>
             <a:r>
-              <a:rPr lang="en-US" dirty="0"/>
-              <a:t>Avoid empty slides. Add provide appropriate diagrams/illustrations at the right side</a:t>
-            </a:r>
-          </a:p>
-          <a:p>
-            <a:r>
-              <a:rPr lang="en-US" dirty="0"/>
-              <a:t>Avoid long sentences (max. 7-10 words per bullet point)</a:t>
-            </a:r>
-          </a:p>
-          <a:p>
-            <a:r>
-              <a:rPr lang="en-US" dirty="0"/>
-              <a:t>Avoid a period after each sentence</a:t>
-            </a:r>
-          </a:p>
-          <a:p>
-            <a:r>
-              <a:rPr lang="en-US" dirty="0"/>
-              <a:t>Maintain consistency, e.g., same bulleting styles, Capital letters, positioning, etc.</a:t>
-            </a:r>
-          </a:p>
-          <a:p>
-            <a:r>
-              <a:rPr lang="en-US" dirty="0"/>
-              <a:t>Maintain the aspect ratio of the images</a:t>
-            </a:r>
-          </a:p>
-          <a:p>
-            <a:r>
-              <a:rPr lang="en-US" dirty="0"/>
-              <a:t>Provide readable code snippets, e.g., use </a:t>
+              <a:rPr lang="de-DE" sz="2400" dirty="0"/>
+              <a:t>Learning </a:t>
             </a:r>
             <a:r>
-              <a:rPr lang="en-US" dirty="0" err="1"/>
-              <a:t>CodeSnap</a:t>
+              <a:rPr lang="de-DE" sz="2400" dirty="0" err="1"/>
+              <a:t>features</a:t>
             </a:r>
-            <a:r>
-              <a:rPr lang="en-US" dirty="0"/>
-              <a:t> plugin from </a:t>
-            </a:r>
-            <a:r>
-              <a:rPr lang="en-US" dirty="0" err="1"/>
-              <a:t>VSCode</a:t>
-            </a:r>
-            <a:endParaRPr lang="en-US" dirty="0"/>
-          </a:p>
-          <a:p>
-            <a:r>
-              <a:rPr lang="en-US" dirty="0"/>
-              <a:t>Use </a:t>
-            </a:r>
-            <a:r>
-              <a:rPr lang="en-US" dirty="0">
-                <a:solidFill>
-                  <a:srgbClr val="0070C0"/>
-                </a:solidFill>
-              </a:rPr>
-              <a:t>blue</a:t>
-            </a:r>
-            <a:r>
-              <a:rPr lang="en-US" dirty="0"/>
-              <a:t> color text to highlight important keywords</a:t>
-            </a:r>
-          </a:p>
-          <a:p>
-            <a:r>
-              <a:rPr lang="en-US" dirty="0"/>
-              <a:t>Use </a:t>
-            </a:r>
-            <a:r>
-              <a:rPr lang="en-US" b="1" dirty="0"/>
-              <a:t>bold</a:t>
-            </a:r>
-            <a:r>
-              <a:rPr lang="en-US" dirty="0"/>
-              <a:t> style for enumerating steps</a:t>
-            </a:r>
+            <a:endParaRPr lang="de-DE" sz="2400" dirty="0"/>
           </a:p>
         </p:txBody>
       </p:sp>
       <p:sp>
         <p:nvSpPr>
-          <p:cNvPr id="4" name="Footer Placeholder 3">
+          <p:cNvPr id="4" name="Inhaltsplatzhalter 3">
             <a:extLst>
               <a:ext uri="{FF2B5EF4-FFF2-40B4-BE49-F238E27FC236}">
-                <a16:creationId xmlns:a16="http://schemas.microsoft.com/office/drawing/2014/main" id="{024CAA1D-FEE1-4E4E-8D22-A6CF84544D5E}"/>
+                <a16:creationId xmlns:a16="http://schemas.microsoft.com/office/drawing/2014/main" id="{B44D6F0C-7F4F-8976-2D97-6A9DA1E96824}"/>
+              </a:ext>
+            </a:extLst>
+          </p:cNvPr>
+          <p:cNvSpPr>
+            <a:spLocks noGrp="1"/>
+          </p:cNvSpPr>
+          <p:nvPr>
+            <p:ph sz="half" idx="2"/>
+          </p:nvPr>
+        </p:nvSpPr>
+        <p:spPr>
+          <a:xfrm>
+            <a:off x="7491618" y="955108"/>
+            <a:ext cx="4325911" cy="5532143"/>
+          </a:xfrm>
+        </p:spPr>
+        <p:txBody>
+          <a:bodyPr numCol="1"/>
+          <a:lstStyle/>
+          <a:p>
+            <a:pPr marL="0" indent="0">
+              <a:buNone/>
+            </a:pPr>
+            <a:r>
+              <a:rPr lang="de-DE" dirty="0" err="1"/>
+              <a:t>StudyDrive</a:t>
+            </a:r>
+            <a:endParaRPr lang="de-DE" dirty="0"/>
+          </a:p>
+          <a:p>
+            <a:r>
+              <a:rPr lang="de-DE" sz="2400" dirty="0"/>
+              <a:t>Easy </a:t>
+            </a:r>
+            <a:r>
+              <a:rPr lang="de-DE" sz="2400" dirty="0" err="1"/>
+              <a:t>sharing</a:t>
+            </a:r>
+            <a:endParaRPr lang="de-DE" sz="2400" dirty="0"/>
+          </a:p>
+          <a:p>
+            <a:r>
+              <a:rPr lang="de-DE" sz="2400" dirty="0" err="1"/>
+              <a:t>Discussion</a:t>
+            </a:r>
+            <a:r>
+              <a:rPr lang="de-DE" sz="2400" dirty="0"/>
+              <a:t> </a:t>
+            </a:r>
+            <a:r>
+              <a:rPr lang="de-DE" sz="2400" dirty="0" err="1"/>
+              <a:t>platform</a:t>
+            </a:r>
+            <a:endParaRPr lang="de-DE" sz="2400" dirty="0"/>
+          </a:p>
+        </p:txBody>
+      </p:sp>
+      <p:sp>
+        <p:nvSpPr>
+          <p:cNvPr id="5" name="Fußzeilenplatzhalter 4">
+            <a:extLst>
+              <a:ext uri="{FF2B5EF4-FFF2-40B4-BE49-F238E27FC236}">
+                <a16:creationId xmlns:a16="http://schemas.microsoft.com/office/drawing/2014/main" id="{4CAB8194-74B4-B216-6231-477D27E39A19}"/>
               </a:ext>
             </a:extLst>
           </p:cNvPr>
@@ -21785,18 +21817,19 @@
           <a:lstStyle/>
           <a:p>
             <a:r>
-              <a:rPr lang="en-US" dirty="0"/>
-              <a:t>Assignment # (if any) - Topic - Group name</a:t>
+              <a:rPr lang="en-US"/>
+              <a:t>Final Product Presentation - LearnStack - DevBallers</a:t>
             </a:r>
+            <a:endParaRPr lang="en-US" dirty="0"/>
           </a:p>
         </p:txBody>
       </p:sp>
       <p:sp>
         <p:nvSpPr>
-          <p:cNvPr id="5" name="Slide Number Placeholder 4">
+          <p:cNvPr id="6" name="Foliennummernplatzhalter 5">
             <a:extLst>
               <a:ext uri="{FF2B5EF4-FFF2-40B4-BE49-F238E27FC236}">
-                <a16:creationId xmlns:a16="http://schemas.microsoft.com/office/drawing/2014/main" id="{3957B7E0-EAB1-453F-B463-A85CC31C09EF}"/>
+                <a16:creationId xmlns:a16="http://schemas.microsoft.com/office/drawing/2014/main" id="{CFDB530B-B569-1196-FBF5-5D823F9955F2}"/>
               </a:ext>
             </a:extLst>
           </p:cNvPr>
@@ -21820,97 +21853,12 @@
           </a:p>
         </p:txBody>
       </p:sp>
-      <p:sp>
-        <p:nvSpPr>
-          <p:cNvPr id="7" name="Rectangle: Rounded Corners 6">
+      <p:pic>
+        <p:nvPicPr>
+          <p:cNvPr id="16" name="Grafik 15">
             <a:extLst>
               <a:ext uri="{FF2B5EF4-FFF2-40B4-BE49-F238E27FC236}">
-                <a16:creationId xmlns:a16="http://schemas.microsoft.com/office/drawing/2014/main" id="{20105942-619B-5503-5E5C-9883C1469E78}"/>
-              </a:ext>
-            </a:extLst>
-          </p:cNvPr>
-          <p:cNvSpPr/>
-          <p:nvPr/>
-        </p:nvSpPr>
-        <p:spPr>
-          <a:xfrm>
-            <a:off x="9680123" y="5794326"/>
-            <a:ext cx="2137408" cy="690113"/>
-          </a:xfrm>
-          <a:prstGeom prst="roundRect">
-            <a:avLst/>
-          </a:prstGeom>
-          <a:solidFill>
-            <a:srgbClr val="FF0000"/>
-          </a:solidFill>
-          <a:ln>
-            <a:noFill/>
-          </a:ln>
-        </p:spPr>
-        <p:style>
-          <a:lnRef idx="2">
-            <a:schemeClr val="accent1">
-              <a:shade val="50000"/>
-            </a:schemeClr>
-          </a:lnRef>
-          <a:fillRef idx="1">
-            <a:schemeClr val="accent1"/>
-          </a:fillRef>
-          <a:effectRef idx="0">
-            <a:schemeClr val="accent1"/>
-          </a:effectRef>
-          <a:fontRef idx="minor">
-            <a:schemeClr val="lt1"/>
-          </a:fontRef>
-        </p:style>
-        <p:txBody>
-          <a:bodyPr rtlCol="0" anchor="ctr"/>
-          <a:lstStyle/>
-          <a:p>
-            <a:pPr algn="ctr"/>
-            <a:r>
-              <a:rPr lang="en-US" dirty="0"/>
-              <a:t>Remove this slide before submitting!</a:t>
-            </a:r>
-          </a:p>
-        </p:txBody>
-      </p:sp>
-    </p:spTree>
-    <p:extLst>
-      <p:ext uri="{BB962C8B-B14F-4D97-AF65-F5344CB8AC3E}">
-        <p14:creationId xmlns:p14="http://schemas.microsoft.com/office/powerpoint/2010/main" val="3427952024"/>
-      </p:ext>
-    </p:extLst>
-  </p:cSld>
-  <p:clrMapOvr>
-    <a:masterClrMapping/>
-  </p:clrMapOvr>
-</p:sld>
-</file>
-
-<file path=ppt/slides/slide3.xml><?xml version="1.0" encoding="utf-8"?>
-<p:sld xmlns:a="http://schemas.openxmlformats.org/drawingml/2006/main" xmlns:r="http://schemas.openxmlformats.org/officeDocument/2006/relationships" xmlns:p="http://schemas.openxmlformats.org/presentationml/2006/main" show="0">
-  <p:cSld>
-    <p:spTree>
-      <p:nvGrpSpPr>
-        <p:cNvPr id="1" name=""/>
-        <p:cNvGrpSpPr/>
-        <p:nvPr/>
-      </p:nvGrpSpPr>
-      <p:grpSpPr>
-        <a:xfrm>
-          <a:off x="0" y="0"/>
-          <a:ext cx="0" cy="0"/>
-          <a:chOff x="0" y="0"/>
-          <a:chExt cx="0" cy="0"/>
-        </a:xfrm>
-      </p:grpSpPr>
-      <p:pic>
-        <p:nvPicPr>
-          <p:cNvPr id="10" name="Picture 9">
-            <a:extLst>
-              <a:ext uri="{FF2B5EF4-FFF2-40B4-BE49-F238E27FC236}">
-                <a16:creationId xmlns:a16="http://schemas.microsoft.com/office/drawing/2014/main" id="{39962B4D-E8E0-837F-2513-3C72672E6E73}"/>
+                <a16:creationId xmlns:a16="http://schemas.microsoft.com/office/drawing/2014/main" id="{5B5D839A-E685-85B8-A6FA-056CEEA75596}"/>
               </a:ext>
             </a:extLst>
           </p:cNvPr>
@@ -21927,20 +21875,86 @@
         </p:blipFill>
         <p:spPr>
           <a:xfrm>
-            <a:off x="6787370" y="1340976"/>
-            <a:ext cx="4324413" cy="2658521"/>
+            <a:off x="4235163" y="1966708"/>
+            <a:ext cx="2943636" cy="2924583"/>
           </a:xfrm>
           <a:prstGeom prst="rect">
             <a:avLst/>
           </a:prstGeom>
         </p:spPr>
       </p:pic>
+      <p:pic>
+        <p:nvPicPr>
+          <p:cNvPr id="17" name="Inhaltsplatzhalter 2">
+            <a:extLst>
+              <a:ext uri="{FF2B5EF4-FFF2-40B4-BE49-F238E27FC236}">
+                <a16:creationId xmlns:a16="http://schemas.microsoft.com/office/drawing/2014/main" id="{8DDEBB41-3FBD-CF09-7B5E-B9451A74605D}"/>
+              </a:ext>
+            </a:extLst>
+          </p:cNvPr>
+          <p:cNvPicPr>
+            <a:picLocks noChangeAspect="1"/>
+          </p:cNvPicPr>
+          <p:nvPr/>
+        </p:nvPicPr>
+        <p:blipFill>
+          <a:blip r:embed="rId3">
+            <a:extLst>
+              <a:ext uri="{96DAC541-7B7A-43D3-8B79-37D633B846F1}">
+                <asvg:svgBlip xmlns:asvg="http://schemas.microsoft.com/office/drawing/2016/SVG/main" r:embed="rId4"/>
+              </a:ext>
+            </a:extLst>
+          </a:blip>
+          <a:stretch>
+            <a:fillRect/>
+          </a:stretch>
+        </p:blipFill>
+        <p:spPr>
+          <a:xfrm>
+            <a:off x="4513181" y="4282213"/>
+            <a:ext cx="2387600" cy="2387600"/>
+          </a:xfrm>
+          <a:prstGeom prst="rect">
+            <a:avLst/>
+          </a:prstGeom>
+        </p:spPr>
+      </p:pic>
+    </p:spTree>
+    <p:extLst>
+      <p:ext uri="{BB962C8B-B14F-4D97-AF65-F5344CB8AC3E}">
+        <p14:creationId xmlns:p14="http://schemas.microsoft.com/office/powerpoint/2010/main" val="977782130"/>
+      </p:ext>
+    </p:extLst>
+  </p:cSld>
+  <p:clrMapOvr>
+    <a:masterClrMapping/>
+  </p:clrMapOvr>
+</p:sld>
+</file>
+
+<file path=ppt/slides/slide3.xml><?xml version="1.0" encoding="utf-8"?>
+<p:sld xmlns:a="http://schemas.openxmlformats.org/drawingml/2006/main" xmlns:r="http://schemas.openxmlformats.org/officeDocument/2006/relationships" xmlns:p="http://schemas.openxmlformats.org/presentationml/2006/main">
+  <p:cSld>
+    <p:spTree>
+      <p:nvGrpSpPr>
+        <p:cNvPr id="1" name=""/>
+        <p:cNvGrpSpPr/>
+        <p:nvPr/>
+      </p:nvGrpSpPr>
+      <p:grpSpPr>
+        <a:xfrm>
+          <a:off x="0" y="0"/>
+          <a:ext cx="0" cy="0"/>
+          <a:chOff x="0" y="0"/>
+          <a:chExt cx="0" cy="0"/>
+        </a:xfrm>
+      </p:grpSpPr>
       <p:sp>
         <p:nvSpPr>
-          <p:cNvPr id="2" name="Title 1">
+          <p:cNvPr id="2" name="Titel 1">
             <a:extLst>
               <a:ext uri="{FF2B5EF4-FFF2-40B4-BE49-F238E27FC236}">
-                <a16:creationId xmlns:a16="http://schemas.microsoft.com/office/drawing/2014/main" id="{A3FE9DF3-11E9-5770-436F-17560511E664}"/>
+                <a16:creationId xmlns:a16="http://schemas.microsoft.com/office/drawing/2014/main" id="{738A5799-19D1-C5E2-BC18-551B3B5FBA6B}"/>
               </a:ext>
             </a:extLst>
           </p:cNvPr>
@@ -21957,18 +21971,135 @@
           <a:lstStyle/>
           <a:p>
             <a:r>
-              <a:rPr lang="en-US" dirty="0"/>
-              <a:t>How To Cite Paper</a:t>
+              <a:rPr lang="de-DE" dirty="0" err="1"/>
+              <a:t>Conceptual</a:t>
             </a:r>
+            <a:r>
+              <a:rPr lang="de-DE" dirty="0"/>
+              <a:t> </a:t>
+            </a:r>
+            <a:r>
+              <a:rPr lang="de-DE" dirty="0" err="1"/>
+              <a:t>solution</a:t>
+            </a:r>
+            <a:endParaRPr lang="de-DE" dirty="0"/>
           </a:p>
         </p:txBody>
       </p:sp>
       <p:sp>
         <p:nvSpPr>
-          <p:cNvPr id="5" name="Footer Placeholder 4">
+          <p:cNvPr id="3" name="Inhaltsplatzhalter 2">
             <a:extLst>
               <a:ext uri="{FF2B5EF4-FFF2-40B4-BE49-F238E27FC236}">
-                <a16:creationId xmlns:a16="http://schemas.microsoft.com/office/drawing/2014/main" id="{759B8094-0290-12FC-927A-6012295DE4D9}"/>
+                <a16:creationId xmlns:a16="http://schemas.microsoft.com/office/drawing/2014/main" id="{C2F8FA7A-C5A5-E09B-147A-E085C66C62C8}"/>
+              </a:ext>
+            </a:extLst>
+          </p:cNvPr>
+          <p:cNvSpPr>
+            <a:spLocks noGrp="1"/>
+          </p:cNvSpPr>
+          <p:nvPr>
+            <p:ph sz="half" idx="1"/>
+          </p:nvPr>
+        </p:nvSpPr>
+        <p:spPr/>
+        <p:txBody>
+          <a:bodyPr anchor="t"/>
+          <a:lstStyle/>
+          <a:p>
+            <a:pPr marL="514350" indent="-514350">
+              <a:buFont typeface="+mj-lt"/>
+              <a:buAutoNum type="arabicPeriod"/>
+            </a:pPr>
+            <a:r>
+              <a:rPr lang="de-DE" dirty="0" err="1"/>
+              <a:t>Identifying</a:t>
+            </a:r>
+            <a:r>
+              <a:rPr lang="de-DE" dirty="0"/>
+              <a:t> </a:t>
+            </a:r>
+            <a:r>
+              <a:rPr lang="de-DE" dirty="0" err="1"/>
+              <a:t>features</a:t>
+            </a:r>
+            <a:endParaRPr lang="de-DE" dirty="0"/>
+          </a:p>
+          <a:p>
+            <a:pPr marL="514350" indent="-514350">
+              <a:buFont typeface="+mj-lt"/>
+              <a:buAutoNum type="arabicPeriod"/>
+            </a:pPr>
+            <a:r>
+              <a:rPr lang="de-DE" dirty="0"/>
+              <a:t>Feature </a:t>
+            </a:r>
+            <a:r>
+              <a:rPr lang="de-DE" dirty="0" err="1"/>
+              <a:t>walkthrough</a:t>
+            </a:r>
+            <a:r>
+              <a:rPr lang="de-DE" dirty="0"/>
+              <a:t> </a:t>
+            </a:r>
+            <a:r>
+              <a:rPr lang="de-DE" dirty="0" err="1"/>
+              <a:t>mentally</a:t>
+            </a:r>
+            <a:endParaRPr lang="de-DE" dirty="0"/>
+          </a:p>
+          <a:p>
+            <a:pPr marL="514350" indent="-514350">
+              <a:buFont typeface="+mj-lt"/>
+              <a:buAutoNum type="arabicPeriod"/>
+            </a:pPr>
+            <a:r>
+              <a:rPr lang="de-DE" dirty="0"/>
+              <a:t>Task </a:t>
+            </a:r>
+            <a:r>
+              <a:rPr lang="de-DE" dirty="0" err="1"/>
+              <a:t>management</a:t>
+            </a:r>
+            <a:endParaRPr lang="de-DE" dirty="0"/>
+          </a:p>
+        </p:txBody>
+      </p:sp>
+      <p:pic>
+        <p:nvPicPr>
+          <p:cNvPr id="12" name="Inhaltsplatzhalter 11">
+            <a:extLst>
+              <a:ext uri="{FF2B5EF4-FFF2-40B4-BE49-F238E27FC236}">
+                <a16:creationId xmlns:a16="http://schemas.microsoft.com/office/drawing/2014/main" id="{DBD472D7-77D8-B377-BC7E-FF758D9B6AD0}"/>
+              </a:ext>
+            </a:extLst>
+          </p:cNvPr>
+          <p:cNvPicPr>
+            <a:picLocks noGrp="1" noChangeAspect="1"/>
+          </p:cNvPicPr>
+          <p:nvPr>
+            <p:ph sz="half" idx="2"/>
+          </p:nvPr>
+        </p:nvPicPr>
+        <p:blipFill>
+          <a:blip r:embed="rId2"/>
+          <a:stretch>
+            <a:fillRect/>
+          </a:stretch>
+        </p:blipFill>
+        <p:spPr>
+          <a:xfrm>
+            <a:off x="7422930" y="1091833"/>
+            <a:ext cx="3143689" cy="5258534"/>
+          </a:xfrm>
+        </p:spPr>
+      </p:pic>
+      <p:sp>
+        <p:nvSpPr>
+          <p:cNvPr id="5" name="Fußzeilenplatzhalter 4">
+            <a:extLst>
+              <a:ext uri="{FF2B5EF4-FFF2-40B4-BE49-F238E27FC236}">
+                <a16:creationId xmlns:a16="http://schemas.microsoft.com/office/drawing/2014/main" id="{50DCB6BD-F6A7-A3DE-5660-FC3EB0395216}"/>
               </a:ext>
             </a:extLst>
           </p:cNvPr>
@@ -21986,7 +22117,7 @@
           <a:p>
             <a:r>
               <a:rPr lang="en-US"/>
-              <a:t>Assignment # (if any) - Topic - Group name</a:t>
+              <a:t>Final Product Presentation - LearnStack - DevBallers</a:t>
             </a:r>
             <a:endParaRPr lang="en-US" dirty="0"/>
           </a:p>
@@ -21994,10 +22125,10 @@
       </p:sp>
       <p:sp>
         <p:nvSpPr>
-          <p:cNvPr id="6" name="Slide Number Placeholder 5">
+          <p:cNvPr id="6" name="Foliennummernplatzhalter 5">
             <a:extLst>
               <a:ext uri="{FF2B5EF4-FFF2-40B4-BE49-F238E27FC236}">
-                <a16:creationId xmlns:a16="http://schemas.microsoft.com/office/drawing/2014/main" id="{60CC9BF5-8742-BF1F-5E40-13ABBBBB614E}"/>
+                <a16:creationId xmlns:a16="http://schemas.microsoft.com/office/drawing/2014/main" id="{3A0B17ED-128E-98B3-D8B8-678121745D37}"/>
               </a:ext>
             </a:extLst>
           </p:cNvPr>
@@ -22021,480 +22152,10 @@
           </a:p>
         </p:txBody>
       </p:sp>
-      <p:pic>
-        <p:nvPicPr>
-          <p:cNvPr id="7" name="Content Placeholder 8">
-            <a:extLst>
-              <a:ext uri="{FF2B5EF4-FFF2-40B4-BE49-F238E27FC236}">
-                <a16:creationId xmlns:a16="http://schemas.microsoft.com/office/drawing/2014/main" id="{BA32B9A9-5ED3-B0B6-8390-C3D2873D92F1}"/>
-              </a:ext>
-            </a:extLst>
-          </p:cNvPr>
-          <p:cNvPicPr>
-            <a:picLocks noGrp="1" noChangeAspect="1"/>
-          </p:cNvPicPr>
-          <p:nvPr>
-            <p:ph sz="half" idx="2"/>
-          </p:nvPr>
-        </p:nvPicPr>
-        <p:blipFill>
-          <a:blip r:embed="rId3"/>
-          <a:stretch>
-            <a:fillRect/>
-          </a:stretch>
-        </p:blipFill>
-        <p:spPr>
-          <a:xfrm>
-            <a:off x="352671" y="1244950"/>
-            <a:ext cx="5645150" cy="1722248"/>
-          </a:xfrm>
-          <a:prstGeom prst="rect">
-            <a:avLst/>
-          </a:prstGeom>
-        </p:spPr>
-      </p:pic>
-      <p:pic>
-        <p:nvPicPr>
-          <p:cNvPr id="8" name="Picture 7">
-            <a:extLst>
-              <a:ext uri="{FF2B5EF4-FFF2-40B4-BE49-F238E27FC236}">
-                <a16:creationId xmlns:a16="http://schemas.microsoft.com/office/drawing/2014/main" id="{E593D74A-D02F-96FD-75FE-040AE07F4858}"/>
-              </a:ext>
-            </a:extLst>
-          </p:cNvPr>
-          <p:cNvPicPr>
-            <a:picLocks noChangeAspect="1"/>
-          </p:cNvPicPr>
-          <p:nvPr/>
-        </p:nvPicPr>
-        <p:blipFill>
-          <a:blip r:embed="rId4"/>
-          <a:stretch>
-            <a:fillRect/>
-          </a:stretch>
-        </p:blipFill>
-        <p:spPr>
-          <a:xfrm>
-            <a:off x="352580" y="3791199"/>
-            <a:ext cx="5645332" cy="2377465"/>
-          </a:xfrm>
-          <a:prstGeom prst="rect">
-            <a:avLst/>
-          </a:prstGeom>
-        </p:spPr>
-      </p:pic>
-      <p:pic>
-        <p:nvPicPr>
-          <p:cNvPr id="9" name="Graphic 8" descr="Cursor with solid fill">
-            <a:extLst>
-              <a:ext uri="{FF2B5EF4-FFF2-40B4-BE49-F238E27FC236}">
-                <a16:creationId xmlns:a16="http://schemas.microsoft.com/office/drawing/2014/main" id="{8E6A755C-846C-B268-433C-B2182A3F5BA3}"/>
-              </a:ext>
-            </a:extLst>
-          </p:cNvPr>
-          <p:cNvPicPr>
-            <a:picLocks noChangeAspect="1"/>
-          </p:cNvPicPr>
-          <p:nvPr/>
-        </p:nvPicPr>
-        <p:blipFill>
-          <a:blip r:embed="rId5">
-            <a:extLst>
-              <a:ext uri="{28A0092B-C50C-407E-A947-70E740481C1C}">
-                <a14:useLocalDpi xmlns:a14="http://schemas.microsoft.com/office/drawing/2010/main" val="0"/>
-              </a:ext>
-              <a:ext uri="{96DAC541-7B7A-43D3-8B79-37D633B846F1}">
-                <asvg:svgBlip xmlns:asvg="http://schemas.microsoft.com/office/drawing/2016/SVG/main" r:embed="rId6"/>
-              </a:ext>
-            </a:extLst>
-          </a:blip>
-          <a:stretch>
-            <a:fillRect/>
-          </a:stretch>
-        </p:blipFill>
-        <p:spPr>
-          <a:xfrm rot="1023158">
-            <a:off x="1610953" y="5908015"/>
-            <a:ext cx="547248" cy="547248"/>
-          </a:xfrm>
-          <a:prstGeom prst="rect">
-            <a:avLst/>
-          </a:prstGeom>
-          <a:effectLst>
-            <a:outerShdw blurRad="50800" dist="38100" dir="5400000" algn="t" rotWithShape="0">
-              <a:prstClr val="black">
-                <a:alpha val="40000"/>
-              </a:prstClr>
-            </a:outerShdw>
-          </a:effectLst>
-        </p:spPr>
-      </p:pic>
-      <p:sp>
-        <p:nvSpPr>
-          <p:cNvPr id="13" name="TextBox 12">
-            <a:extLst>
-              <a:ext uri="{FF2B5EF4-FFF2-40B4-BE49-F238E27FC236}">
-                <a16:creationId xmlns:a16="http://schemas.microsoft.com/office/drawing/2014/main" id="{9D647442-8317-A0FF-500B-58F9F661A1FA}"/>
-              </a:ext>
-            </a:extLst>
-          </p:cNvPr>
-          <p:cNvSpPr txBox="1"/>
-          <p:nvPr/>
-        </p:nvSpPr>
-        <p:spPr>
-          <a:xfrm>
-            <a:off x="997374" y="862642"/>
-            <a:ext cx="4355744" cy="369332"/>
-          </a:xfrm>
-          <a:prstGeom prst="rect">
-            <a:avLst/>
-          </a:prstGeom>
-          <a:noFill/>
-        </p:spPr>
-        <p:txBody>
-          <a:bodyPr wrap="none" rtlCol="0">
-            <a:spAutoFit/>
-          </a:bodyPr>
-          <a:lstStyle/>
-          <a:p>
-            <a:r>
-              <a:rPr lang="en-US" b="1" dirty="0"/>
-              <a:t>Step 1: Search for a paper in Google Scholar</a:t>
-            </a:r>
-          </a:p>
-        </p:txBody>
-      </p:sp>
-      <p:sp>
-        <p:nvSpPr>
-          <p:cNvPr id="14" name="TextBox 13">
-            <a:extLst>
-              <a:ext uri="{FF2B5EF4-FFF2-40B4-BE49-F238E27FC236}">
-                <a16:creationId xmlns:a16="http://schemas.microsoft.com/office/drawing/2014/main" id="{6434EA10-0946-9858-FFDE-9D1BAB7D11AE}"/>
-              </a:ext>
-            </a:extLst>
-          </p:cNvPr>
-          <p:cNvSpPr txBox="1"/>
-          <p:nvPr/>
-        </p:nvSpPr>
-        <p:spPr>
-          <a:xfrm>
-            <a:off x="2157596" y="3408891"/>
-            <a:ext cx="2035301" cy="369332"/>
-          </a:xfrm>
-          <a:prstGeom prst="rect">
-            <a:avLst/>
-          </a:prstGeom>
-          <a:noFill/>
-        </p:spPr>
-        <p:txBody>
-          <a:bodyPr wrap="none" rtlCol="0">
-            <a:spAutoFit/>
-          </a:bodyPr>
-          <a:lstStyle/>
-          <a:p>
-            <a:pPr algn="ctr"/>
-            <a:r>
-              <a:rPr lang="en-US" b="1" dirty="0"/>
-              <a:t>Step 2: Click on cite</a:t>
-            </a:r>
-          </a:p>
-        </p:txBody>
-      </p:sp>
-      <p:sp>
-        <p:nvSpPr>
-          <p:cNvPr id="15" name="TextBox 14">
-            <a:extLst>
-              <a:ext uri="{FF2B5EF4-FFF2-40B4-BE49-F238E27FC236}">
-                <a16:creationId xmlns:a16="http://schemas.microsoft.com/office/drawing/2014/main" id="{64CDDBFA-E5FB-303B-D510-A2E1520260C7}"/>
-              </a:ext>
-            </a:extLst>
-          </p:cNvPr>
-          <p:cNvSpPr txBox="1"/>
-          <p:nvPr/>
-        </p:nvSpPr>
-        <p:spPr>
-          <a:xfrm>
-            <a:off x="8043142" y="944954"/>
-            <a:ext cx="1812869" cy="369332"/>
-          </a:xfrm>
-          <a:prstGeom prst="rect">
-            <a:avLst/>
-          </a:prstGeom>
-          <a:noFill/>
-        </p:spPr>
-        <p:txBody>
-          <a:bodyPr wrap="none" rtlCol="0">
-            <a:spAutoFit/>
-          </a:bodyPr>
-          <a:lstStyle/>
-          <a:p>
-            <a:pPr algn="ctr"/>
-            <a:r>
-              <a:rPr lang="en-US" b="1" dirty="0"/>
-              <a:t>Step 3: Copy APA</a:t>
-            </a:r>
-          </a:p>
-        </p:txBody>
-      </p:sp>
-      <p:sp>
-        <p:nvSpPr>
-          <p:cNvPr id="16" name="TextBox 15">
-            <a:extLst>
-              <a:ext uri="{FF2B5EF4-FFF2-40B4-BE49-F238E27FC236}">
-                <a16:creationId xmlns:a16="http://schemas.microsoft.com/office/drawing/2014/main" id="{00A3B67D-51BB-BCC0-FF81-37D1138217C2}"/>
-              </a:ext>
-            </a:extLst>
-          </p:cNvPr>
-          <p:cNvSpPr txBox="1"/>
-          <p:nvPr/>
-        </p:nvSpPr>
-        <p:spPr>
-          <a:xfrm>
-            <a:off x="6530196" y="4922827"/>
-            <a:ext cx="4838761" cy="553998"/>
-          </a:xfrm>
-          <a:prstGeom prst="rect">
-            <a:avLst/>
-          </a:prstGeom>
-          <a:noFill/>
-        </p:spPr>
-        <p:txBody>
-          <a:bodyPr wrap="square" rtlCol="0">
-            <a:spAutoFit/>
-          </a:bodyPr>
-          <a:lstStyle/>
-          <a:p>
-            <a:pPr marL="228600" indent="-228600">
-              <a:buFont typeface="+mj-lt"/>
-              <a:buAutoNum type="arabicPeriod"/>
-            </a:pPr>
-            <a:r>
-              <a:rPr lang="en-US" sz="1000" dirty="0" err="1"/>
-              <a:t>Chatti</a:t>
-            </a:r>
-            <a:r>
-              <a:rPr lang="en-US" sz="1000" dirty="0"/>
-              <a:t>, M. A., </a:t>
-            </a:r>
-            <a:r>
-              <a:rPr lang="en-US" sz="1000" dirty="0" err="1"/>
-              <a:t>Dyckhoff</a:t>
-            </a:r>
-            <a:r>
-              <a:rPr lang="en-US" sz="1000" dirty="0"/>
-              <a:t>, A. L., Schroeder, U., &amp; </a:t>
-            </a:r>
-            <a:r>
-              <a:rPr lang="en-US" sz="1000" dirty="0" err="1"/>
-              <a:t>Thüs</a:t>
-            </a:r>
-            <a:r>
-              <a:rPr lang="en-US" sz="1000" dirty="0"/>
-              <a:t>, H. (2012). A reference model for learning analytics. International journal of Technology Enhanced learning, 4(5-6), 318-331.</a:t>
-            </a:r>
-          </a:p>
-        </p:txBody>
-      </p:sp>
-      <p:sp>
-        <p:nvSpPr>
-          <p:cNvPr id="17" name="TextBox 16">
-            <a:extLst>
-              <a:ext uri="{FF2B5EF4-FFF2-40B4-BE49-F238E27FC236}">
-                <a16:creationId xmlns:a16="http://schemas.microsoft.com/office/drawing/2014/main" id="{470918A3-63EF-841E-2539-547DF216706C}"/>
-              </a:ext>
-            </a:extLst>
-          </p:cNvPr>
-          <p:cNvSpPr txBox="1"/>
-          <p:nvPr/>
-        </p:nvSpPr>
-        <p:spPr>
-          <a:xfrm>
-            <a:off x="7591993" y="4553495"/>
-            <a:ext cx="2715167" cy="369332"/>
-          </a:xfrm>
-          <a:prstGeom prst="rect">
-            <a:avLst/>
-          </a:prstGeom>
-          <a:noFill/>
-        </p:spPr>
-        <p:txBody>
-          <a:bodyPr wrap="none" rtlCol="0">
-            <a:spAutoFit/>
-          </a:bodyPr>
-          <a:lstStyle/>
-          <a:p>
-            <a:pPr algn="ctr"/>
-            <a:r>
-              <a:rPr lang="en-US" b="1" dirty="0"/>
-              <a:t>Step 4: Use it presentation</a:t>
-            </a:r>
-          </a:p>
-        </p:txBody>
-      </p:sp>
-      <p:sp>
-        <p:nvSpPr>
-          <p:cNvPr id="19" name="Ribbon: Tilted Down 18">
-            <a:extLst>
-              <a:ext uri="{FF2B5EF4-FFF2-40B4-BE49-F238E27FC236}">
-                <a16:creationId xmlns:a16="http://schemas.microsoft.com/office/drawing/2014/main" id="{0BFA4CF5-4486-E02A-0439-96DA496C9870}"/>
-              </a:ext>
-            </a:extLst>
-          </p:cNvPr>
-          <p:cNvSpPr/>
-          <p:nvPr/>
-        </p:nvSpPr>
-        <p:spPr>
-          <a:xfrm>
-            <a:off x="10291223" y="6050898"/>
-            <a:ext cx="1690120" cy="436353"/>
-          </a:xfrm>
-          <a:prstGeom prst="ribbon">
-            <a:avLst>
-              <a:gd name="adj1" fmla="val 16667"/>
-              <a:gd name="adj2" fmla="val 73761"/>
-            </a:avLst>
-          </a:prstGeom>
-        </p:spPr>
-        <p:style>
-          <a:lnRef idx="2">
-            <a:schemeClr val="accent1">
-              <a:shade val="50000"/>
-            </a:schemeClr>
-          </a:lnRef>
-          <a:fillRef idx="1">
-            <a:schemeClr val="accent1"/>
-          </a:fillRef>
-          <a:effectRef idx="0">
-            <a:schemeClr val="accent1"/>
-          </a:effectRef>
-          <a:fontRef idx="minor">
-            <a:schemeClr val="lt1"/>
-          </a:fontRef>
-        </p:style>
-        <p:txBody>
-          <a:bodyPr rtlCol="0" anchor="ctr"/>
-          <a:lstStyle/>
-          <a:p>
-            <a:pPr algn="ctr"/>
-            <a:r>
-              <a:rPr lang="en-US" dirty="0"/>
-              <a:t>Example </a:t>
-            </a:r>
-            <a:r>
-              <a:rPr lang="en-US" dirty="0">
-                <a:sym typeface="Wingdings" panose="05000000000000000000" pitchFamily="2" charset="2"/>
-              </a:rPr>
-              <a:t></a:t>
-            </a:r>
-            <a:endParaRPr lang="en-US" dirty="0"/>
-          </a:p>
-        </p:txBody>
-      </p:sp>
-      <p:pic>
-        <p:nvPicPr>
-          <p:cNvPr id="3" name="Graphic 2" descr="Cursor with solid fill">
-            <a:extLst>
-              <a:ext uri="{FF2B5EF4-FFF2-40B4-BE49-F238E27FC236}">
-                <a16:creationId xmlns:a16="http://schemas.microsoft.com/office/drawing/2014/main" id="{C70FC673-4346-087E-12DA-6D65136D1B14}"/>
-              </a:ext>
-            </a:extLst>
-          </p:cNvPr>
-          <p:cNvPicPr>
-            <a:picLocks noChangeAspect="1"/>
-          </p:cNvPicPr>
-          <p:nvPr/>
-        </p:nvPicPr>
-        <p:blipFill>
-          <a:blip r:embed="rId5">
-            <a:extLst>
-              <a:ext uri="{28A0092B-C50C-407E-A947-70E740481C1C}">
-                <a14:useLocalDpi xmlns:a14="http://schemas.microsoft.com/office/drawing/2010/main" val="0"/>
-              </a:ext>
-              <a:ext uri="{96DAC541-7B7A-43D3-8B79-37D633B846F1}">
-                <asvg:svgBlip xmlns:asvg="http://schemas.microsoft.com/office/drawing/2016/SVG/main" r:embed="rId6"/>
-              </a:ext>
-            </a:extLst>
-          </a:blip>
-          <a:stretch>
-            <a:fillRect/>
-          </a:stretch>
-        </p:blipFill>
-        <p:spPr>
-          <a:xfrm rot="1023158">
-            <a:off x="10575300" y="2738447"/>
-            <a:ext cx="547248" cy="547248"/>
-          </a:xfrm>
-          <a:prstGeom prst="rect">
-            <a:avLst/>
-          </a:prstGeom>
-          <a:effectLst>
-            <a:outerShdw blurRad="50800" dist="38100" dir="5400000" algn="t" rotWithShape="0">
-              <a:prstClr val="black">
-                <a:alpha val="40000"/>
-              </a:prstClr>
-            </a:outerShdw>
-          </a:effectLst>
-        </p:spPr>
-      </p:pic>
-      <p:sp>
-        <p:nvSpPr>
-          <p:cNvPr id="11" name="Rectangle: Rounded Corners 10">
-            <a:extLst>
-              <a:ext uri="{FF2B5EF4-FFF2-40B4-BE49-F238E27FC236}">
-                <a16:creationId xmlns:a16="http://schemas.microsoft.com/office/drawing/2014/main" id="{41748539-5FED-8699-C590-BA19B6C8E44D}"/>
-              </a:ext>
-            </a:extLst>
-          </p:cNvPr>
-          <p:cNvSpPr/>
-          <p:nvPr/>
-        </p:nvSpPr>
-        <p:spPr>
-          <a:xfrm>
-            <a:off x="9975286" y="765353"/>
-            <a:ext cx="2137408" cy="690113"/>
-          </a:xfrm>
-          <a:prstGeom prst="roundRect">
-            <a:avLst/>
-          </a:prstGeom>
-          <a:solidFill>
-            <a:srgbClr val="FF0000"/>
-          </a:solidFill>
-          <a:ln>
-            <a:noFill/>
-          </a:ln>
-        </p:spPr>
-        <p:style>
-          <a:lnRef idx="2">
-            <a:schemeClr val="accent1">
-              <a:shade val="50000"/>
-            </a:schemeClr>
-          </a:lnRef>
-          <a:fillRef idx="1">
-            <a:schemeClr val="accent1"/>
-          </a:fillRef>
-          <a:effectRef idx="0">
-            <a:schemeClr val="accent1"/>
-          </a:effectRef>
-          <a:fontRef idx="minor">
-            <a:schemeClr val="lt1"/>
-          </a:fontRef>
-        </p:style>
-        <p:txBody>
-          <a:bodyPr rtlCol="0" anchor="ctr"/>
-          <a:lstStyle/>
-          <a:p>
-            <a:pPr algn="ctr"/>
-            <a:r>
-              <a:rPr lang="en-US" dirty="0"/>
-              <a:t>Remove this slide before submitting!</a:t>
-            </a:r>
-          </a:p>
-        </p:txBody>
-      </p:sp>
     </p:spTree>
     <p:extLst>
       <p:ext uri="{BB962C8B-B14F-4D97-AF65-F5344CB8AC3E}">
-        <p14:creationId xmlns:p14="http://schemas.microsoft.com/office/powerpoint/2010/main" val="1416174985"/>
+        <p14:creationId xmlns:p14="http://schemas.microsoft.com/office/powerpoint/2010/main" val="1814873625"/>
       </p:ext>
     </p:extLst>
   </p:cSld>
@@ -22505,7 +22166,7 @@
 </file>
 
 <file path=ppt/slides/slide4.xml><?xml version="1.0" encoding="utf-8"?>
-<p:sld xmlns:a="http://schemas.openxmlformats.org/drawingml/2006/main" xmlns:r="http://schemas.openxmlformats.org/officeDocument/2006/relationships" xmlns:p="http://schemas.openxmlformats.org/presentationml/2006/main" show="0">
+<p:sld xmlns:a="http://schemas.openxmlformats.org/drawingml/2006/main" xmlns:r="http://schemas.openxmlformats.org/officeDocument/2006/relationships" xmlns:p="http://schemas.openxmlformats.org/presentationml/2006/main">
   <p:cSld>
     <p:spTree>
       <p:nvGrpSpPr>
@@ -22523,10 +22184,10 @@
       </p:grpSpPr>
       <p:sp>
         <p:nvSpPr>
-          <p:cNvPr id="2" name="Title 1">
+          <p:cNvPr id="2" name="Titel 1">
             <a:extLst>
               <a:ext uri="{FF2B5EF4-FFF2-40B4-BE49-F238E27FC236}">
-                <a16:creationId xmlns:a16="http://schemas.microsoft.com/office/drawing/2014/main" id="{B8DB2494-491C-8269-16A9-30680CDB9E87}"/>
+                <a16:creationId xmlns:a16="http://schemas.microsoft.com/office/drawing/2014/main" id="{4D361EB8-7D84-BCB8-A52A-68BF22162F2B}"/>
               </a:ext>
             </a:extLst>
           </p:cNvPr>
@@ -22543,18 +22204,18 @@
           <a:lstStyle/>
           <a:p>
             <a:r>
-              <a:rPr lang="en-US" dirty="0"/>
-              <a:t>How To Cite Paper – Example – Presentations</a:t>
+              <a:rPr lang="de-DE" dirty="0"/>
+              <a:t>Implementation</a:t>
             </a:r>
           </a:p>
         </p:txBody>
       </p:sp>
       <p:sp>
         <p:nvSpPr>
-          <p:cNvPr id="3" name="Content Placeholder 2">
+          <p:cNvPr id="3" name="Inhaltsplatzhalter 2">
             <a:extLst>
               <a:ext uri="{FF2B5EF4-FFF2-40B4-BE49-F238E27FC236}">
-                <a16:creationId xmlns:a16="http://schemas.microsoft.com/office/drawing/2014/main" id="{E5A3586A-2BE9-9C59-F76F-4A34AE1CD5FF}"/>
+                <a16:creationId xmlns:a16="http://schemas.microsoft.com/office/drawing/2014/main" id="{686926AD-003B-6F7C-C116-9F4E7CC84606}"/>
               </a:ext>
             </a:extLst>
           </p:cNvPr>
@@ -22565,130 +22226,46 @@
             <p:ph sz="half" idx="1"/>
           </p:nvPr>
         </p:nvSpPr>
-        <p:spPr>
-          <a:xfrm>
-            <a:off x="374469" y="959668"/>
-            <a:ext cx="5797731" cy="5527311"/>
-          </a:xfrm>
-        </p:spPr>
+        <p:spPr/>
         <p:txBody>
-          <a:bodyPr>
-            <a:normAutofit fontScale="92500"/>
-          </a:bodyPr>
+          <a:bodyPr/>
           <a:lstStyle/>
           <a:p>
-            <a:r>
-              <a:rPr lang="en-US" dirty="0"/>
-              <a:t>Learning Analytics Reference Model [1]</a:t>
-            </a:r>
-          </a:p>
-          <a:p>
-            <a:pPr lvl="6"/>
-            <a:endParaRPr lang="en-US" dirty="0">
-              <a:solidFill>
-                <a:schemeClr val="bg1">
-                  <a:lumMod val="75000"/>
-                </a:schemeClr>
-              </a:solidFill>
-            </a:endParaRPr>
-          </a:p>
-          <a:p>
-            <a:r>
-              <a:rPr lang="en-US" dirty="0">
-                <a:solidFill>
-                  <a:schemeClr val="bg1">
-                    <a:lumMod val="75000"/>
-                  </a:schemeClr>
-                </a:solidFill>
-              </a:rPr>
-              <a:t>Openness in LA Reference Model</a:t>
-            </a:r>
-          </a:p>
-          <a:p>
-            <a:pPr lvl="1"/>
-            <a:r>
-              <a:rPr lang="en-US" dirty="0">
-                <a:solidFill>
-                  <a:schemeClr val="bg1">
-                    <a:lumMod val="75000"/>
-                  </a:schemeClr>
-                </a:solidFill>
-              </a:rPr>
-              <a:t>Provide open learning, open dataset, open methods, open standards, etc.</a:t>
-            </a:r>
-          </a:p>
-          <a:p>
-            <a:pPr lvl="5"/>
-            <a:endParaRPr lang="en-US" dirty="0">
-              <a:solidFill>
-                <a:schemeClr val="bg1">
-                  <a:lumMod val="75000"/>
-                </a:schemeClr>
-              </a:solidFill>
-            </a:endParaRPr>
-          </a:p>
-          <a:p>
-            <a:r>
-              <a:rPr lang="en-US" dirty="0">
-                <a:solidFill>
-                  <a:schemeClr val="bg1">
-                    <a:lumMod val="75000"/>
-                  </a:schemeClr>
-                </a:solidFill>
-              </a:rPr>
-              <a:t>Open Learning Analytics Platform</a:t>
-            </a:r>
-          </a:p>
-          <a:p>
-            <a:pPr lvl="1"/>
-            <a:r>
-              <a:rPr lang="en-US" dirty="0">
-                <a:solidFill>
-                  <a:schemeClr val="bg1">
-                    <a:lumMod val="75000"/>
-                  </a:schemeClr>
-                </a:solidFill>
-              </a:rPr>
-              <a:t>Implementation of the LA Reference Model</a:t>
-            </a:r>
-          </a:p>
-          <a:p>
-            <a:pPr lvl="1"/>
-            <a:r>
-              <a:rPr lang="en-US" dirty="0">
-                <a:solidFill>
-                  <a:schemeClr val="bg1">
-                    <a:lumMod val="75000"/>
-                  </a:schemeClr>
-                </a:solidFill>
-              </a:rPr>
-              <a:t>Human-centered learning analytics platform</a:t>
-            </a:r>
-          </a:p>
-          <a:p>
-            <a:pPr lvl="1"/>
-            <a:r>
-              <a:rPr lang="en-US" dirty="0">
-                <a:solidFill>
-                  <a:schemeClr val="bg1">
-                    <a:lumMod val="75000"/>
-                  </a:schemeClr>
-                </a:solidFill>
-              </a:rPr>
-              <a:t>Support end users in exploring and defining custom indicators that meet their needs</a:t>
-            </a:r>
-          </a:p>
-          <a:p>
-            <a:endParaRPr lang="en-US" dirty="0"/>
+            <a:endParaRPr lang="de-DE" dirty="0"/>
           </a:p>
         </p:txBody>
       </p:sp>
       <p:sp>
         <p:nvSpPr>
-          <p:cNvPr id="5" name="Footer Placeholder 4">
+          <p:cNvPr id="4" name="Inhaltsplatzhalter 3">
             <a:extLst>
               <a:ext uri="{FF2B5EF4-FFF2-40B4-BE49-F238E27FC236}">
-                <a16:creationId xmlns:a16="http://schemas.microsoft.com/office/drawing/2014/main" id="{772318B6-DED2-F9FE-7EC8-C3BF854E90EA}"/>
+                <a16:creationId xmlns:a16="http://schemas.microsoft.com/office/drawing/2014/main" id="{13660433-F726-33F5-CB08-181B01CBF228}"/>
+              </a:ext>
+            </a:extLst>
+          </p:cNvPr>
+          <p:cNvSpPr>
+            <a:spLocks noGrp="1"/>
+          </p:cNvSpPr>
+          <p:nvPr>
+            <p:ph sz="half" idx="2"/>
+          </p:nvPr>
+        </p:nvSpPr>
+        <p:spPr/>
+        <p:txBody>
+          <a:bodyPr/>
+          <a:lstStyle/>
+          <a:p>
+            <a:endParaRPr lang="de-DE"/>
+          </a:p>
+        </p:txBody>
+      </p:sp>
+      <p:sp>
+        <p:nvSpPr>
+          <p:cNvPr id="5" name="Fußzeilenplatzhalter 4">
+            <a:extLst>
+              <a:ext uri="{FF2B5EF4-FFF2-40B4-BE49-F238E27FC236}">
+                <a16:creationId xmlns:a16="http://schemas.microsoft.com/office/drawing/2014/main" id="{CE9606A9-0CA9-68A8-3414-8EBDC6F8685D}"/>
               </a:ext>
             </a:extLst>
           </p:cNvPr>
@@ -22706,17 +22283,18 @@
           <a:p>
             <a:r>
               <a:rPr lang="en-US"/>
-              <a:t>Assignment # (if any) - Topic - Group name</a:t>
+              <a:t>Final Product Presentation - LearnStack - DevBallers</a:t>
             </a:r>
+            <a:endParaRPr lang="en-US" dirty="0"/>
           </a:p>
         </p:txBody>
       </p:sp>
       <p:sp>
         <p:nvSpPr>
-          <p:cNvPr id="6" name="Slide Number Placeholder 5">
+          <p:cNvPr id="6" name="Foliennummernplatzhalter 5">
             <a:extLst>
               <a:ext uri="{FF2B5EF4-FFF2-40B4-BE49-F238E27FC236}">
-                <a16:creationId xmlns:a16="http://schemas.microsoft.com/office/drawing/2014/main" id="{CD598908-18D8-8FE9-9B90-5D5E306C4F6B}"/>
+                <a16:creationId xmlns:a16="http://schemas.microsoft.com/office/drawing/2014/main" id="{1633A245-1153-B040-6763-8D64E077D449}"/>
               </a:ext>
             </a:extLst>
           </p:cNvPr>
@@ -22740,976 +22318,10 @@
           </a:p>
         </p:txBody>
       </p:sp>
-      <p:pic>
-        <p:nvPicPr>
-          <p:cNvPr id="7" name="Content Placeholder 45">
-            <a:extLst>
-              <a:ext uri="{FF2B5EF4-FFF2-40B4-BE49-F238E27FC236}">
-                <a16:creationId xmlns:a16="http://schemas.microsoft.com/office/drawing/2014/main" id="{8907774B-E40E-F2FD-9592-3FC882813CC7}"/>
-              </a:ext>
-            </a:extLst>
-          </p:cNvPr>
-          <p:cNvPicPr>
-            <a:picLocks noGrp="1" noChangeAspect="1"/>
-          </p:cNvPicPr>
-          <p:nvPr>
-            <p:ph sz="half" idx="2"/>
-          </p:nvPr>
-        </p:nvPicPr>
-        <p:blipFill>
-          <a:blip r:embed="rId2">
-            <a:alphaModFix amt="20000"/>
-          </a:blip>
-          <a:stretch>
-            <a:fillRect/>
-          </a:stretch>
-        </p:blipFill>
-        <p:spPr bwMode="auto">
-          <a:xfrm>
-            <a:off x="6411221" y="1822973"/>
-            <a:ext cx="5645150" cy="2795590"/>
-          </a:xfrm>
-          <a:prstGeom prst="rect">
-            <a:avLst/>
-          </a:prstGeom>
-        </p:spPr>
-      </p:pic>
-      <p:sp>
-        <p:nvSpPr>
-          <p:cNvPr id="8" name="TextBox 7">
-            <a:extLst>
-              <a:ext uri="{FF2B5EF4-FFF2-40B4-BE49-F238E27FC236}">
-                <a16:creationId xmlns:a16="http://schemas.microsoft.com/office/drawing/2014/main" id="{A2745876-12DA-E539-A8FF-8A9ADA475328}"/>
-              </a:ext>
-            </a:extLst>
-          </p:cNvPr>
-          <p:cNvSpPr txBox="1"/>
-          <p:nvPr/>
-        </p:nvSpPr>
-        <p:spPr>
-          <a:xfrm>
-            <a:off x="8134710" y="5932981"/>
-            <a:ext cx="3769932" cy="553998"/>
-          </a:xfrm>
-          <a:prstGeom prst="rect">
-            <a:avLst/>
-          </a:prstGeom>
-          <a:noFill/>
-          <a:ln>
-            <a:solidFill>
-              <a:srgbClr val="FF0000"/>
-            </a:solidFill>
-            <a:prstDash val="sysDot"/>
-          </a:ln>
-        </p:spPr>
-        <p:txBody>
-          <a:bodyPr wrap="square" rtlCol="0">
-            <a:spAutoFit/>
-          </a:bodyPr>
-          <a:lstStyle/>
-          <a:p>
-            <a:pPr marL="228600" indent="-228600">
-              <a:buFont typeface="+mj-lt"/>
-              <a:buAutoNum type="arabicPeriod"/>
-            </a:pPr>
-            <a:r>
-              <a:rPr lang="en-US" sz="1000" dirty="0" err="1"/>
-              <a:t>Chatti</a:t>
-            </a:r>
-            <a:r>
-              <a:rPr lang="en-US" sz="1000" dirty="0"/>
-              <a:t>, M. A., </a:t>
-            </a:r>
-            <a:r>
-              <a:rPr lang="en-US" sz="1000" dirty="0" err="1"/>
-              <a:t>Dyckhoff</a:t>
-            </a:r>
-            <a:r>
-              <a:rPr lang="en-US" sz="1000" dirty="0"/>
-              <a:t>, A. L., Schroeder, U., &amp; </a:t>
-            </a:r>
-            <a:r>
-              <a:rPr lang="en-US" sz="1000" dirty="0" err="1"/>
-              <a:t>Thüs</a:t>
-            </a:r>
-            <a:r>
-              <a:rPr lang="en-US" sz="1000" dirty="0"/>
-              <a:t>, H. (2012). A reference model for learning analytics. International journal of Technology Enhanced learning, 4(5-6), 318-331.</a:t>
-            </a:r>
-          </a:p>
-        </p:txBody>
-      </p:sp>
-      <p:sp>
-        <p:nvSpPr>
-          <p:cNvPr id="9" name="TextBox 3">
-            <a:extLst>
-              <a:ext uri="{FF2B5EF4-FFF2-40B4-BE49-F238E27FC236}">
-                <a16:creationId xmlns:a16="http://schemas.microsoft.com/office/drawing/2014/main" id="{3C51F148-1F91-6064-3CC2-053F874DE594}"/>
-              </a:ext>
-            </a:extLst>
-          </p:cNvPr>
-          <p:cNvSpPr txBox="1"/>
-          <p:nvPr/>
-        </p:nvSpPr>
-        <p:spPr bwMode="auto">
-          <a:xfrm>
-            <a:off x="7655883" y="4748606"/>
-            <a:ext cx="2677784" cy="276999"/>
-          </a:xfrm>
-          <a:prstGeom prst="rect">
-            <a:avLst/>
-          </a:prstGeom>
-          <a:noFill/>
-        </p:spPr>
-        <p:txBody>
-          <a:bodyPr wrap="none" rtlCol="0">
-            <a:spAutoFit/>
-          </a:bodyPr>
-          <a:lstStyle/>
-          <a:p>
-            <a:pPr algn="ctr">
-              <a:defRPr/>
-            </a:pPr>
-            <a:r>
-              <a:rPr lang="en-US" sz="1200" dirty="0"/>
-              <a:t>Learning Analytics Reference Model [1]</a:t>
-            </a:r>
-            <a:endParaRPr lang="en-US" sz="1200" baseline="-25000" dirty="0"/>
-          </a:p>
-        </p:txBody>
-      </p:sp>
-      <p:sp>
-        <p:nvSpPr>
-          <p:cNvPr id="10" name="Rectangle 9">
-            <a:extLst>
-              <a:ext uri="{FF2B5EF4-FFF2-40B4-BE49-F238E27FC236}">
-                <a16:creationId xmlns:a16="http://schemas.microsoft.com/office/drawing/2014/main" id="{1EC87E16-677C-DF9D-A472-8167C84B7A0D}"/>
-              </a:ext>
-            </a:extLst>
-          </p:cNvPr>
-          <p:cNvSpPr/>
-          <p:nvPr/>
-        </p:nvSpPr>
-        <p:spPr>
-          <a:xfrm>
-            <a:off x="9932150" y="4682110"/>
-            <a:ext cx="414068" cy="409990"/>
-          </a:xfrm>
-          <a:prstGeom prst="rect">
-            <a:avLst/>
-          </a:prstGeom>
-          <a:noFill/>
-          <a:ln>
-            <a:solidFill>
-              <a:srgbClr val="FF0000"/>
-            </a:solidFill>
-            <a:prstDash val="sysDot"/>
-          </a:ln>
-        </p:spPr>
-        <p:style>
-          <a:lnRef idx="2">
-            <a:schemeClr val="accent1">
-              <a:shade val="50000"/>
-            </a:schemeClr>
-          </a:lnRef>
-          <a:fillRef idx="1">
-            <a:schemeClr val="accent1"/>
-          </a:fillRef>
-          <a:effectRef idx="0">
-            <a:schemeClr val="accent1"/>
-          </a:effectRef>
-          <a:fontRef idx="minor">
-            <a:schemeClr val="lt1"/>
-          </a:fontRef>
-        </p:style>
-        <p:txBody>
-          <a:bodyPr rtlCol="0" anchor="ctr"/>
-          <a:lstStyle/>
-          <a:p>
-            <a:pPr algn="ctr"/>
-            <a:endParaRPr lang="en-US"/>
-          </a:p>
-        </p:txBody>
-      </p:sp>
-      <p:sp>
-        <p:nvSpPr>
-          <p:cNvPr id="11" name="Arrow: Right 10">
-            <a:extLst>
-              <a:ext uri="{FF2B5EF4-FFF2-40B4-BE49-F238E27FC236}">
-                <a16:creationId xmlns:a16="http://schemas.microsoft.com/office/drawing/2014/main" id="{B0A3B1C2-CFF6-891E-BB95-BEE18013AFDD}"/>
-              </a:ext>
-            </a:extLst>
-          </p:cNvPr>
-          <p:cNvSpPr/>
-          <p:nvPr/>
-        </p:nvSpPr>
-        <p:spPr>
-          <a:xfrm rot="10800000">
-            <a:off x="10388619" y="4686664"/>
-            <a:ext cx="414068" cy="409990"/>
-          </a:xfrm>
-          <a:prstGeom prst="rightArrow">
-            <a:avLst/>
-          </a:prstGeom>
-        </p:spPr>
-        <p:style>
-          <a:lnRef idx="2">
-            <a:schemeClr val="accent1">
-              <a:shade val="50000"/>
-            </a:schemeClr>
-          </a:lnRef>
-          <a:fillRef idx="1">
-            <a:schemeClr val="accent1"/>
-          </a:fillRef>
-          <a:effectRef idx="0">
-            <a:schemeClr val="accent1"/>
-          </a:effectRef>
-          <a:fontRef idx="minor">
-            <a:schemeClr val="lt1"/>
-          </a:fontRef>
-        </p:style>
-        <p:txBody>
-          <a:bodyPr rtlCol="0" anchor="ctr"/>
-          <a:lstStyle/>
-          <a:p>
-            <a:pPr algn="ctr"/>
-            <a:endParaRPr lang="en-US" dirty="0"/>
-          </a:p>
-        </p:txBody>
-      </p:sp>
-      <p:sp>
-        <p:nvSpPr>
-          <p:cNvPr id="12" name="Arrow: Right 11">
-            <a:extLst>
-              <a:ext uri="{FF2B5EF4-FFF2-40B4-BE49-F238E27FC236}">
-                <a16:creationId xmlns:a16="http://schemas.microsoft.com/office/drawing/2014/main" id="{A71F9331-81A1-6847-54CF-3D0D5D76834E}"/>
-              </a:ext>
-            </a:extLst>
-          </p:cNvPr>
-          <p:cNvSpPr/>
-          <p:nvPr/>
-        </p:nvSpPr>
-        <p:spPr>
-          <a:xfrm rot="5400000">
-            <a:off x="9930111" y="5494471"/>
-            <a:ext cx="414068" cy="409990"/>
-          </a:xfrm>
-          <a:prstGeom prst="rightArrow">
-            <a:avLst/>
-          </a:prstGeom>
-        </p:spPr>
-        <p:style>
-          <a:lnRef idx="2">
-            <a:schemeClr val="accent1">
-              <a:shade val="50000"/>
-            </a:schemeClr>
-          </a:lnRef>
-          <a:fillRef idx="1">
-            <a:schemeClr val="accent1"/>
-          </a:fillRef>
-          <a:effectRef idx="0">
-            <a:schemeClr val="accent1"/>
-          </a:effectRef>
-          <a:fontRef idx="minor">
-            <a:schemeClr val="lt1"/>
-          </a:fontRef>
-        </p:style>
-        <p:txBody>
-          <a:bodyPr rtlCol="0" anchor="ctr"/>
-          <a:lstStyle/>
-          <a:p>
-            <a:pPr algn="ctr"/>
-            <a:endParaRPr lang="en-US"/>
-          </a:p>
-        </p:txBody>
-      </p:sp>
-      <p:sp>
-        <p:nvSpPr>
-          <p:cNvPr id="13" name="TextBox 12">
-            <a:extLst>
-              <a:ext uri="{FF2B5EF4-FFF2-40B4-BE49-F238E27FC236}">
-                <a16:creationId xmlns:a16="http://schemas.microsoft.com/office/drawing/2014/main" id="{B370492F-0AA6-9D25-A2E4-338CD0E415C6}"/>
-              </a:ext>
-            </a:extLst>
-          </p:cNvPr>
-          <p:cNvSpPr txBox="1"/>
-          <p:nvPr/>
-        </p:nvSpPr>
-        <p:spPr>
-          <a:xfrm>
-            <a:off x="10806581" y="4425440"/>
-            <a:ext cx="1385419" cy="1200329"/>
-          </a:xfrm>
-          <a:prstGeom prst="rect">
-            <a:avLst/>
-          </a:prstGeom>
-          <a:noFill/>
-        </p:spPr>
-        <p:txBody>
-          <a:bodyPr wrap="square" rtlCol="0">
-            <a:spAutoFit/>
-          </a:bodyPr>
-          <a:lstStyle/>
-          <a:p>
-            <a:r>
-              <a:rPr lang="en-US" dirty="0"/>
-              <a:t>Citation number in square brackets</a:t>
-            </a:r>
-          </a:p>
-        </p:txBody>
-      </p:sp>
-      <p:sp>
-        <p:nvSpPr>
-          <p:cNvPr id="14" name="TextBox 13">
-            <a:extLst>
-              <a:ext uri="{FF2B5EF4-FFF2-40B4-BE49-F238E27FC236}">
-                <a16:creationId xmlns:a16="http://schemas.microsoft.com/office/drawing/2014/main" id="{839F5BB7-312D-5D28-927A-22433D196F3D}"/>
-              </a:ext>
-            </a:extLst>
-          </p:cNvPr>
-          <p:cNvSpPr txBox="1"/>
-          <p:nvPr/>
-        </p:nvSpPr>
-        <p:spPr>
-          <a:xfrm>
-            <a:off x="6789799" y="5301712"/>
-            <a:ext cx="3185487" cy="646331"/>
-          </a:xfrm>
-          <a:prstGeom prst="rect">
-            <a:avLst/>
-          </a:prstGeom>
-          <a:noFill/>
-        </p:spPr>
-        <p:txBody>
-          <a:bodyPr wrap="square" rtlCol="0">
-            <a:spAutoFit/>
-          </a:bodyPr>
-          <a:lstStyle/>
-          <a:p>
-            <a:pPr algn="r"/>
-            <a:r>
-              <a:rPr lang="en-US" dirty="0"/>
-              <a:t>Bottom corner with font size 10. Use number bullet point</a:t>
-            </a:r>
-          </a:p>
-        </p:txBody>
-      </p:sp>
-      <p:sp>
-        <p:nvSpPr>
-          <p:cNvPr id="15" name="Rectangle 14">
-            <a:extLst>
-              <a:ext uri="{FF2B5EF4-FFF2-40B4-BE49-F238E27FC236}">
-                <a16:creationId xmlns:a16="http://schemas.microsoft.com/office/drawing/2014/main" id="{119B2EF8-DFE4-72DC-CC94-CBBC92511115}"/>
-              </a:ext>
-            </a:extLst>
-          </p:cNvPr>
-          <p:cNvSpPr/>
-          <p:nvPr/>
-        </p:nvSpPr>
-        <p:spPr>
-          <a:xfrm>
-            <a:off x="5540684" y="1028258"/>
-            <a:ext cx="414068" cy="409990"/>
-          </a:xfrm>
-          <a:prstGeom prst="rect">
-            <a:avLst/>
-          </a:prstGeom>
-          <a:noFill/>
-          <a:ln>
-            <a:solidFill>
-              <a:srgbClr val="FF0000"/>
-            </a:solidFill>
-            <a:prstDash val="sysDot"/>
-          </a:ln>
-        </p:spPr>
-        <p:style>
-          <a:lnRef idx="2">
-            <a:schemeClr val="accent1">
-              <a:shade val="50000"/>
-            </a:schemeClr>
-          </a:lnRef>
-          <a:fillRef idx="1">
-            <a:schemeClr val="accent1"/>
-          </a:fillRef>
-          <a:effectRef idx="0">
-            <a:schemeClr val="accent1"/>
-          </a:effectRef>
-          <a:fontRef idx="minor">
-            <a:schemeClr val="lt1"/>
-          </a:fontRef>
-        </p:style>
-        <p:txBody>
-          <a:bodyPr rtlCol="0" anchor="ctr"/>
-          <a:lstStyle/>
-          <a:p>
-            <a:pPr algn="ctr"/>
-            <a:endParaRPr lang="en-US"/>
-          </a:p>
-        </p:txBody>
-      </p:sp>
-      <p:sp>
-        <p:nvSpPr>
-          <p:cNvPr id="16" name="Arrow: Right 15">
-            <a:extLst>
-              <a:ext uri="{FF2B5EF4-FFF2-40B4-BE49-F238E27FC236}">
-                <a16:creationId xmlns:a16="http://schemas.microsoft.com/office/drawing/2014/main" id="{2835FD36-C991-F9BF-15FE-798F9F2F2B99}"/>
-              </a:ext>
-            </a:extLst>
-          </p:cNvPr>
-          <p:cNvSpPr/>
-          <p:nvPr/>
-        </p:nvSpPr>
-        <p:spPr>
-          <a:xfrm rot="10800000">
-            <a:off x="5997153" y="1032812"/>
-            <a:ext cx="414068" cy="409990"/>
-          </a:xfrm>
-          <a:prstGeom prst="rightArrow">
-            <a:avLst/>
-          </a:prstGeom>
-        </p:spPr>
-        <p:style>
-          <a:lnRef idx="2">
-            <a:schemeClr val="accent1">
-              <a:shade val="50000"/>
-            </a:schemeClr>
-          </a:lnRef>
-          <a:fillRef idx="1">
-            <a:schemeClr val="accent1"/>
-          </a:fillRef>
-          <a:effectRef idx="0">
-            <a:schemeClr val="accent1"/>
-          </a:effectRef>
-          <a:fontRef idx="minor">
-            <a:schemeClr val="lt1"/>
-          </a:fontRef>
-        </p:style>
-        <p:txBody>
-          <a:bodyPr rtlCol="0" anchor="ctr"/>
-          <a:lstStyle/>
-          <a:p>
-            <a:pPr algn="ctr"/>
-            <a:endParaRPr lang="en-US" dirty="0"/>
-          </a:p>
-        </p:txBody>
-      </p:sp>
-      <p:sp>
-        <p:nvSpPr>
-          <p:cNvPr id="17" name="TextBox 16">
-            <a:extLst>
-              <a:ext uri="{FF2B5EF4-FFF2-40B4-BE49-F238E27FC236}">
-                <a16:creationId xmlns:a16="http://schemas.microsoft.com/office/drawing/2014/main" id="{DCA601ED-E829-F819-2C24-F102F58D5EB5}"/>
-              </a:ext>
-            </a:extLst>
-          </p:cNvPr>
-          <p:cNvSpPr txBox="1"/>
-          <p:nvPr/>
-        </p:nvSpPr>
-        <p:spPr>
-          <a:xfrm>
-            <a:off x="6415115" y="1048587"/>
-            <a:ext cx="3740939" cy="369332"/>
-          </a:xfrm>
-          <a:prstGeom prst="rect">
-            <a:avLst/>
-          </a:prstGeom>
-          <a:noFill/>
-        </p:spPr>
-        <p:txBody>
-          <a:bodyPr wrap="square" rtlCol="0">
-            <a:spAutoFit/>
-          </a:bodyPr>
-          <a:lstStyle/>
-          <a:p>
-            <a:r>
-              <a:rPr lang="en-US" dirty="0"/>
-              <a:t>Citation number in square brackets</a:t>
-            </a:r>
-          </a:p>
-        </p:txBody>
-      </p:sp>
-      <p:sp>
-        <p:nvSpPr>
-          <p:cNvPr id="4" name="Rectangle: Rounded Corners 3">
-            <a:extLst>
-              <a:ext uri="{FF2B5EF4-FFF2-40B4-BE49-F238E27FC236}">
-                <a16:creationId xmlns:a16="http://schemas.microsoft.com/office/drawing/2014/main" id="{1CC821AA-CF50-1BD4-A558-65D76025F769}"/>
-              </a:ext>
-            </a:extLst>
-          </p:cNvPr>
-          <p:cNvSpPr/>
-          <p:nvPr/>
-        </p:nvSpPr>
-        <p:spPr>
-          <a:xfrm>
-            <a:off x="9975286" y="765353"/>
-            <a:ext cx="2137408" cy="690113"/>
-          </a:xfrm>
-          <a:prstGeom prst="roundRect">
-            <a:avLst/>
-          </a:prstGeom>
-          <a:solidFill>
-            <a:srgbClr val="FF0000"/>
-          </a:solidFill>
-          <a:ln>
-            <a:noFill/>
-          </a:ln>
-        </p:spPr>
-        <p:style>
-          <a:lnRef idx="2">
-            <a:schemeClr val="accent1">
-              <a:shade val="50000"/>
-            </a:schemeClr>
-          </a:lnRef>
-          <a:fillRef idx="1">
-            <a:schemeClr val="accent1"/>
-          </a:fillRef>
-          <a:effectRef idx="0">
-            <a:schemeClr val="accent1"/>
-          </a:effectRef>
-          <a:fontRef idx="minor">
-            <a:schemeClr val="lt1"/>
-          </a:fontRef>
-        </p:style>
-        <p:txBody>
-          <a:bodyPr rtlCol="0" anchor="ctr"/>
-          <a:lstStyle/>
-          <a:p>
-            <a:pPr algn="ctr"/>
-            <a:r>
-              <a:rPr lang="en-US" dirty="0"/>
-              <a:t>Remove this slide before submitting!</a:t>
-            </a:r>
-          </a:p>
-        </p:txBody>
-      </p:sp>
     </p:spTree>
     <p:extLst>
       <p:ext uri="{BB962C8B-B14F-4D97-AF65-F5344CB8AC3E}">
-        <p14:creationId xmlns:p14="http://schemas.microsoft.com/office/powerpoint/2010/main" val="731300986"/>
-      </p:ext>
-    </p:extLst>
-  </p:cSld>
-  <p:clrMapOvr>
-    <a:masterClrMapping/>
-  </p:clrMapOvr>
-  <p:timing>
-    <p:tnLst>
-      <p:par>
-        <p:cTn id="1" dur="indefinite" restart="never" nodeType="tmRoot">
-          <p:childTnLst>
-            <p:seq concurrent="1" nextAc="seek">
-              <p:cTn id="2" dur="indefinite" nodeType="mainSeq">
-                <p:childTnLst>
-                  <p:par>
-                    <p:cTn id="3" fill="hold">
-                      <p:stCondLst>
-                        <p:cond delay="indefinite"/>
-                        <p:cond evt="onBegin" delay="0">
-                          <p:tn val="2"/>
-                        </p:cond>
-                      </p:stCondLst>
-                      <p:childTnLst>
-                        <p:par>
-                          <p:cTn id="4" fill="hold">
-                            <p:stCondLst>
-                              <p:cond delay="0"/>
-                            </p:stCondLst>
-                            <p:childTnLst>
-                              <p:par>
-                                <p:cTn id="5" presetID="10" presetClass="entr" presetSubtype="0" fill="hold" nodeType="withEffect">
-                                  <p:stCondLst>
-                                    <p:cond delay="0"/>
-                                  </p:stCondLst>
-                                  <p:childTnLst>
-                                    <p:set>
-                                      <p:cBhvr>
-                                        <p:cTn id="6" dur="1" fill="hold">
-                                          <p:stCondLst>
-                                            <p:cond delay="0"/>
-                                          </p:stCondLst>
-                                        </p:cTn>
-                                        <p:tgtEl>
-                                          <p:spTgt spid="7"/>
-                                        </p:tgtEl>
-                                        <p:attrNameLst>
-                                          <p:attrName>style.visibility</p:attrName>
-                                        </p:attrNameLst>
-                                      </p:cBhvr>
-                                      <p:to>
-                                        <p:strVal val="visible"/>
-                                      </p:to>
-                                    </p:set>
-                                    <p:animEffect transition="in" filter="fade">
-                                      <p:cBhvr>
-                                        <p:cTn id="7" dur="1000"/>
-                                        <p:tgtEl>
-                                          <p:spTgt spid="7"/>
-                                        </p:tgtEl>
-                                      </p:cBhvr>
-                                    </p:animEffect>
-                                  </p:childTnLst>
-                                </p:cTn>
-                              </p:par>
-                              <p:par>
-                                <p:cTn id="8" presetID="10" presetClass="entr" presetSubtype="0" fill="hold" grpId="0" nodeType="withEffect">
-                                  <p:stCondLst>
-                                    <p:cond delay="0"/>
-                                  </p:stCondLst>
-                                  <p:childTnLst>
-                                    <p:set>
-                                      <p:cBhvr>
-                                        <p:cTn id="9" dur="1" fill="hold">
-                                          <p:stCondLst>
-                                            <p:cond delay="0"/>
-                                          </p:stCondLst>
-                                        </p:cTn>
-                                        <p:tgtEl>
-                                          <p:spTgt spid="9"/>
-                                        </p:tgtEl>
-                                        <p:attrNameLst>
-                                          <p:attrName>style.visibility</p:attrName>
-                                        </p:attrNameLst>
-                                      </p:cBhvr>
-                                      <p:to>
-                                        <p:strVal val="visible"/>
-                                      </p:to>
-                                    </p:set>
-                                    <p:animEffect transition="in" filter="fade">
-                                      <p:cBhvr>
-                                        <p:cTn id="10" dur="500"/>
-                                        <p:tgtEl>
-                                          <p:spTgt spid="9"/>
-                                        </p:tgtEl>
-                                      </p:cBhvr>
-                                    </p:animEffect>
-                                  </p:childTnLst>
-                                </p:cTn>
-                              </p:par>
-                            </p:childTnLst>
-                          </p:cTn>
-                        </p:par>
-                      </p:childTnLst>
-                    </p:cTn>
-                  </p:par>
-                </p:childTnLst>
-              </p:cTn>
-              <p:prevCondLst>
-                <p:cond evt="onPrev" delay="0">
-                  <p:tgtEl>
-                    <p:sldTgt/>
-                  </p:tgtEl>
-                </p:cond>
-              </p:prevCondLst>
-              <p:nextCondLst>
-                <p:cond evt="onNext" delay="0">
-                  <p:tgtEl>
-                    <p:sldTgt/>
-                  </p:tgtEl>
-                </p:cond>
-              </p:nextCondLst>
-            </p:seq>
-          </p:childTnLst>
-        </p:cTn>
-      </p:par>
-    </p:tnLst>
-    <p:bldLst>
-      <p:bldP spid="9" grpId="0"/>
-    </p:bldLst>
-  </p:timing>
-</p:sld>
-</file>
-
-<file path=ppt/slides/slide5.xml><?xml version="1.0" encoding="utf-8"?>
-<p:sld xmlns:a="http://schemas.openxmlformats.org/drawingml/2006/main" xmlns:r="http://schemas.openxmlformats.org/officeDocument/2006/relationships" xmlns:p="http://schemas.openxmlformats.org/presentationml/2006/main">
-  <p:cSld>
-    <p:spTree>
-      <p:nvGrpSpPr>
-        <p:cNvPr id="1" name=""/>
-        <p:cNvGrpSpPr/>
-        <p:nvPr/>
-      </p:nvGrpSpPr>
-      <p:grpSpPr>
-        <a:xfrm>
-          <a:off x="0" y="0"/>
-          <a:ext cx="0" cy="0"/>
-          <a:chOff x="0" y="0"/>
-          <a:chExt cx="0" cy="0"/>
-        </a:xfrm>
-      </p:grpSpPr>
-      <p:sp>
-        <p:nvSpPr>
-          <p:cNvPr id="6" name="Title 5">
-            <a:extLst>
-              <a:ext uri="{FF2B5EF4-FFF2-40B4-BE49-F238E27FC236}">
-                <a16:creationId xmlns:a16="http://schemas.microsoft.com/office/drawing/2014/main" id="{A491AD3B-C3D0-4952-95CC-594D26DF3664}"/>
-              </a:ext>
-            </a:extLst>
-          </p:cNvPr>
-          <p:cNvSpPr>
-            <a:spLocks noGrp="1"/>
-          </p:cNvSpPr>
-          <p:nvPr>
-            <p:ph type="title"/>
-          </p:nvPr>
-        </p:nvSpPr>
-        <p:spPr/>
-        <p:txBody>
-          <a:bodyPr/>
-          <a:lstStyle/>
-          <a:p>
-            <a:endParaRPr lang="en-US"/>
-          </a:p>
-        </p:txBody>
-      </p:sp>
-      <p:sp>
-        <p:nvSpPr>
-          <p:cNvPr id="7" name="Content Placeholder 6">
-            <a:extLst>
-              <a:ext uri="{FF2B5EF4-FFF2-40B4-BE49-F238E27FC236}">
-                <a16:creationId xmlns:a16="http://schemas.microsoft.com/office/drawing/2014/main" id="{B5E04D37-3FF0-400E-A0A1-1DB49C9142D1}"/>
-              </a:ext>
-            </a:extLst>
-          </p:cNvPr>
-          <p:cNvSpPr>
-            <a:spLocks noGrp="1"/>
-          </p:cNvSpPr>
-          <p:nvPr>
-            <p:ph sz="half" idx="1"/>
-          </p:nvPr>
-        </p:nvSpPr>
-        <p:spPr/>
-        <p:txBody>
-          <a:bodyPr/>
-          <a:lstStyle/>
-          <a:p>
-            <a:endParaRPr lang="en-US"/>
-          </a:p>
-        </p:txBody>
-      </p:sp>
-      <p:sp>
-        <p:nvSpPr>
-          <p:cNvPr id="8" name="Content Placeholder 7">
-            <a:extLst>
-              <a:ext uri="{FF2B5EF4-FFF2-40B4-BE49-F238E27FC236}">
-                <a16:creationId xmlns:a16="http://schemas.microsoft.com/office/drawing/2014/main" id="{E6B7B44B-ECD7-49B3-B9B7-9C3FDA0EA18D}"/>
-              </a:ext>
-            </a:extLst>
-          </p:cNvPr>
-          <p:cNvSpPr>
-            <a:spLocks noGrp="1"/>
-          </p:cNvSpPr>
-          <p:nvPr>
-            <p:ph sz="half" idx="2"/>
-          </p:nvPr>
-        </p:nvSpPr>
-        <p:spPr/>
-        <p:txBody>
-          <a:bodyPr/>
-          <a:lstStyle/>
-          <a:p>
-            <a:endParaRPr lang="en-US"/>
-          </a:p>
-        </p:txBody>
-      </p:sp>
-      <p:sp>
-        <p:nvSpPr>
-          <p:cNvPr id="4" name="Footer Placeholder 3">
-            <a:extLst>
-              <a:ext uri="{FF2B5EF4-FFF2-40B4-BE49-F238E27FC236}">
-                <a16:creationId xmlns:a16="http://schemas.microsoft.com/office/drawing/2014/main" id="{D6893AD8-AF44-4889-8450-B7D20C011833}"/>
-              </a:ext>
-            </a:extLst>
-          </p:cNvPr>
-          <p:cNvSpPr>
-            <a:spLocks noGrp="1"/>
-          </p:cNvSpPr>
-          <p:nvPr>
-            <p:ph type="ftr" sz="quarter" idx="11"/>
-          </p:nvPr>
-        </p:nvSpPr>
-        <p:spPr/>
-        <p:txBody>
-          <a:bodyPr/>
-          <a:lstStyle/>
-          <a:p>
-            <a:r>
-              <a:rPr lang="en-US"/>
-              <a:t>Assignment # (if any) - Topic - Group name</a:t>
-            </a:r>
-          </a:p>
-        </p:txBody>
-      </p:sp>
-      <p:sp>
-        <p:nvSpPr>
-          <p:cNvPr id="5" name="Slide Number Placeholder 4">
-            <a:extLst>
-              <a:ext uri="{FF2B5EF4-FFF2-40B4-BE49-F238E27FC236}">
-                <a16:creationId xmlns:a16="http://schemas.microsoft.com/office/drawing/2014/main" id="{D5E5C100-34BF-46E0-82EE-D4366CC6213A}"/>
-              </a:ext>
-            </a:extLst>
-          </p:cNvPr>
-          <p:cNvSpPr>
-            <a:spLocks noGrp="1"/>
-          </p:cNvSpPr>
-          <p:nvPr>
-            <p:ph type="sldNum" sz="quarter" idx="12"/>
-          </p:nvPr>
-        </p:nvSpPr>
-        <p:spPr/>
-        <p:txBody>
-          <a:bodyPr/>
-          <a:lstStyle/>
-          <a:p>
-            <a:fld id="{E32A53FC-A1F5-4D9E-915D-C1AF2CE43DED}" type="slidenum">
-              <a:rPr lang="en-US" smtClean="0"/>
-              <a:t>5</a:t>
-            </a:fld>
-            <a:endParaRPr lang="en-US"/>
-          </a:p>
-        </p:txBody>
-      </p:sp>
-    </p:spTree>
-    <p:extLst>
-      <p:ext uri="{BB962C8B-B14F-4D97-AF65-F5344CB8AC3E}">
-        <p14:creationId xmlns:p14="http://schemas.microsoft.com/office/powerpoint/2010/main" val="3018162798"/>
-      </p:ext>
-    </p:extLst>
-  </p:cSld>
-  <p:clrMapOvr>
-    <a:masterClrMapping/>
-  </p:clrMapOvr>
-</p:sld>
-</file>
-
-<file path=ppt/slides/slide6.xml><?xml version="1.0" encoding="utf-8"?>
-<p:sld xmlns:a="http://schemas.openxmlformats.org/drawingml/2006/main" xmlns:r="http://schemas.openxmlformats.org/officeDocument/2006/relationships" xmlns:p="http://schemas.openxmlformats.org/presentationml/2006/main">
-  <p:cSld>
-    <p:spTree>
-      <p:nvGrpSpPr>
-        <p:cNvPr id="1" name=""/>
-        <p:cNvGrpSpPr/>
-        <p:nvPr/>
-      </p:nvGrpSpPr>
-      <p:grpSpPr>
-        <a:xfrm>
-          <a:off x="0" y="0"/>
-          <a:ext cx="0" cy="0"/>
-          <a:chOff x="0" y="0"/>
-          <a:chExt cx="0" cy="0"/>
-        </a:xfrm>
-      </p:grpSpPr>
-      <p:sp>
-        <p:nvSpPr>
-          <p:cNvPr id="2" name="Title 1">
-            <a:extLst>
-              <a:ext uri="{FF2B5EF4-FFF2-40B4-BE49-F238E27FC236}">
-                <a16:creationId xmlns:a16="http://schemas.microsoft.com/office/drawing/2014/main" id="{7306D9B1-E816-464A-9891-0B78186433B2}"/>
-              </a:ext>
-            </a:extLst>
-          </p:cNvPr>
-          <p:cNvSpPr>
-            <a:spLocks noGrp="1"/>
-          </p:cNvSpPr>
-          <p:nvPr>
-            <p:ph type="title"/>
-          </p:nvPr>
-        </p:nvSpPr>
-        <p:spPr/>
-        <p:txBody>
-          <a:bodyPr/>
-          <a:lstStyle/>
-          <a:p>
-            <a:endParaRPr lang="en-US"/>
-          </a:p>
-        </p:txBody>
-      </p:sp>
-      <p:sp>
-        <p:nvSpPr>
-          <p:cNvPr id="3" name="Content Placeholder 2">
-            <a:extLst>
-              <a:ext uri="{FF2B5EF4-FFF2-40B4-BE49-F238E27FC236}">
-                <a16:creationId xmlns:a16="http://schemas.microsoft.com/office/drawing/2014/main" id="{74038DF1-D330-4FDA-82AF-DE3EC1C80838}"/>
-              </a:ext>
-            </a:extLst>
-          </p:cNvPr>
-          <p:cNvSpPr>
-            <a:spLocks noGrp="1"/>
-          </p:cNvSpPr>
-          <p:nvPr>
-            <p:ph idx="1"/>
-          </p:nvPr>
-        </p:nvSpPr>
-        <p:spPr/>
-        <p:txBody>
-          <a:bodyPr/>
-          <a:lstStyle/>
-          <a:p>
-            <a:endParaRPr lang="en-US"/>
-          </a:p>
-        </p:txBody>
-      </p:sp>
-      <p:sp>
-        <p:nvSpPr>
-          <p:cNvPr id="4" name="Footer Placeholder 3">
-            <a:extLst>
-              <a:ext uri="{FF2B5EF4-FFF2-40B4-BE49-F238E27FC236}">
-                <a16:creationId xmlns:a16="http://schemas.microsoft.com/office/drawing/2014/main" id="{AC506E43-BF21-4819-99E0-4365D6D52867}"/>
-              </a:ext>
-            </a:extLst>
-          </p:cNvPr>
-          <p:cNvSpPr>
-            <a:spLocks noGrp="1"/>
-          </p:cNvSpPr>
-          <p:nvPr>
-            <p:ph type="ftr" sz="quarter" idx="11"/>
-          </p:nvPr>
-        </p:nvSpPr>
-        <p:spPr/>
-        <p:txBody>
-          <a:bodyPr/>
-          <a:lstStyle/>
-          <a:p>
-            <a:r>
-              <a:rPr lang="en-US"/>
-              <a:t>Assignment # (if any) - Topic - Group name</a:t>
-            </a:r>
-          </a:p>
-        </p:txBody>
-      </p:sp>
-      <p:sp>
-        <p:nvSpPr>
-          <p:cNvPr id="5" name="Slide Number Placeholder 4">
-            <a:extLst>
-              <a:ext uri="{FF2B5EF4-FFF2-40B4-BE49-F238E27FC236}">
-                <a16:creationId xmlns:a16="http://schemas.microsoft.com/office/drawing/2014/main" id="{1AC7837C-DDDB-4AF2-AF29-F17B8FB378E6}"/>
-              </a:ext>
-            </a:extLst>
-          </p:cNvPr>
-          <p:cNvSpPr>
-            <a:spLocks noGrp="1"/>
-          </p:cNvSpPr>
-          <p:nvPr>
-            <p:ph type="sldNum" sz="quarter" idx="12"/>
-          </p:nvPr>
-        </p:nvSpPr>
-        <p:spPr/>
-        <p:txBody>
-          <a:bodyPr/>
-          <a:lstStyle/>
-          <a:p>
-            <a:fld id="{E32A53FC-A1F5-4D9E-915D-C1AF2CE43DED}" type="slidenum">
-              <a:rPr lang="en-US" smtClean="0"/>
-              <a:t>6</a:t>
-            </a:fld>
-            <a:endParaRPr lang="en-US"/>
-          </a:p>
-        </p:txBody>
-      </p:sp>
-    </p:spTree>
-    <p:extLst>
-      <p:ext uri="{BB962C8B-B14F-4D97-AF65-F5344CB8AC3E}">
-        <p14:creationId xmlns:p14="http://schemas.microsoft.com/office/powerpoint/2010/main" val="3184402079"/>
+        <p14:creationId xmlns:p14="http://schemas.microsoft.com/office/powerpoint/2010/main" val="945663776"/>
       </p:ext>
     </p:extLst>
   </p:cSld>

</xml_diff>

<commit_message>
upload the correct final presentation
</commit_message>
<xml_diff>
--- a/artifacts/devballers_final.pptx
+++ b/artifacts/devballers_final.pptx
@@ -5,16 +5,18 @@
     <p:sldMasterId id="2147483648" r:id="rId1"/>
   </p:sldMasterIdLst>
   <p:notesMasterIdLst>
-    <p:notesMasterId r:id="rId6"/>
+    <p:notesMasterId r:id="rId8"/>
   </p:notesMasterIdLst>
   <p:handoutMasterIdLst>
-    <p:handoutMasterId r:id="rId7"/>
+    <p:handoutMasterId r:id="rId9"/>
   </p:handoutMasterIdLst>
   <p:sldIdLst>
     <p:sldId id="262" r:id="rId2"/>
     <p:sldId id="265" r:id="rId3"/>
     <p:sldId id="264" r:id="rId4"/>
     <p:sldId id="263" r:id="rId5"/>
+    <p:sldId id="266" r:id="rId6"/>
+    <p:sldId id="268" r:id="rId7"/>
   </p:sldIdLst>
   <p:sldSz cx="12192000" cy="6858000"/>
   <p:notesSz cx="6858000" cy="9144000"/>
@@ -22231,32 +22233,37 @@
           <a:bodyPr/>
           <a:lstStyle/>
           <a:p>
+            <a:r>
+              <a:rPr lang="de-DE" dirty="0"/>
+              <a:t>MongoDB</a:t>
+            </a:r>
+          </a:p>
+          <a:p>
+            <a:r>
+              <a:rPr lang="de-DE" dirty="0"/>
+              <a:t>Express.js</a:t>
+            </a:r>
+          </a:p>
+          <a:p>
+            <a:r>
+              <a:rPr lang="de-DE" dirty="0"/>
+              <a:t>Angular</a:t>
+            </a:r>
+          </a:p>
+          <a:p>
+            <a:r>
+              <a:rPr lang="de-DE" dirty="0"/>
+              <a:t>Node.js</a:t>
+            </a:r>
+          </a:p>
+          <a:p>
+            <a:r>
+              <a:rPr lang="de-DE" dirty="0"/>
+              <a:t>Material Design</a:t>
+            </a:r>
+          </a:p>
+          <a:p>
             <a:endParaRPr lang="de-DE" dirty="0"/>
-          </a:p>
-        </p:txBody>
-      </p:sp>
-      <p:sp>
-        <p:nvSpPr>
-          <p:cNvPr id="4" name="Inhaltsplatzhalter 3">
-            <a:extLst>
-              <a:ext uri="{FF2B5EF4-FFF2-40B4-BE49-F238E27FC236}">
-                <a16:creationId xmlns:a16="http://schemas.microsoft.com/office/drawing/2014/main" id="{13660433-F726-33F5-CB08-181B01CBF228}"/>
-              </a:ext>
-            </a:extLst>
-          </p:cNvPr>
-          <p:cNvSpPr>
-            <a:spLocks noGrp="1"/>
-          </p:cNvSpPr>
-          <p:nvPr>
-            <p:ph sz="half" idx="2"/>
-          </p:nvPr>
-        </p:nvSpPr>
-        <p:spPr/>
-        <p:txBody>
-          <a:bodyPr/>
-          <a:lstStyle/>
-          <a:p>
-            <a:endParaRPr lang="de-DE"/>
           </a:p>
         </p:txBody>
       </p:sp>
@@ -22318,10 +22325,483 @@
           </a:p>
         </p:txBody>
       </p:sp>
+      <p:pic>
+        <p:nvPicPr>
+          <p:cNvPr id="1028" name="Picture 4" descr="MEAN Stack Development Course | ICT-Trainings">
+            <a:extLst>
+              <a:ext uri="{FF2B5EF4-FFF2-40B4-BE49-F238E27FC236}">
+                <a16:creationId xmlns:a16="http://schemas.microsoft.com/office/drawing/2014/main" id="{45098644-1A17-D34B-A70A-D904158B5866}"/>
+              </a:ext>
+            </a:extLst>
+          </p:cNvPr>
+          <p:cNvPicPr>
+            <a:picLocks noGrp="1" noChangeAspect="1" noChangeArrowheads="1"/>
+          </p:cNvPicPr>
+          <p:nvPr>
+            <p:ph sz="half" idx="2"/>
+          </p:nvPr>
+        </p:nvPicPr>
+        <p:blipFill>
+          <a:blip r:embed="rId2">
+            <a:extLst>
+              <a:ext uri="{28A0092B-C50C-407E-A947-70E740481C1C}">
+                <a14:useLocalDpi xmlns:a14="http://schemas.microsoft.com/office/drawing/2010/main" val="0"/>
+              </a:ext>
+            </a:extLst>
+          </a:blip>
+          <a:srcRect/>
+          <a:stretch>
+            <a:fillRect/>
+          </a:stretch>
+        </p:blipFill>
+        <p:spPr bwMode="auto">
+          <a:xfrm>
+            <a:off x="6172200" y="2237232"/>
+            <a:ext cx="5645150" cy="2967736"/>
+          </a:xfrm>
+          <a:prstGeom prst="rect">
+            <a:avLst/>
+          </a:prstGeom>
+          <a:noFill/>
+          <a:extLst>
+            <a:ext uri="{909E8E84-426E-40DD-AFC4-6F175D3DCCD1}">
+              <a14:hiddenFill xmlns:a14="http://schemas.microsoft.com/office/drawing/2010/main">
+                <a:solidFill>
+                  <a:srgbClr val="FFFFFF"/>
+                </a:solidFill>
+              </a14:hiddenFill>
+            </a:ext>
+          </a:extLst>
+        </p:spPr>
+      </p:pic>
     </p:spTree>
     <p:extLst>
       <p:ext uri="{BB962C8B-B14F-4D97-AF65-F5344CB8AC3E}">
         <p14:creationId xmlns:p14="http://schemas.microsoft.com/office/powerpoint/2010/main" val="945663776"/>
+      </p:ext>
+    </p:extLst>
+  </p:cSld>
+  <p:clrMapOvr>
+    <a:masterClrMapping/>
+  </p:clrMapOvr>
+</p:sld>
+</file>
+
+<file path=ppt/slides/slide5.xml><?xml version="1.0" encoding="utf-8"?>
+<p:sld xmlns:a="http://schemas.openxmlformats.org/drawingml/2006/main" xmlns:r="http://schemas.openxmlformats.org/officeDocument/2006/relationships" xmlns:p="http://schemas.openxmlformats.org/presentationml/2006/main">
+  <p:cSld>
+    <p:spTree>
+      <p:nvGrpSpPr>
+        <p:cNvPr id="1" name=""/>
+        <p:cNvGrpSpPr/>
+        <p:nvPr/>
+      </p:nvGrpSpPr>
+      <p:grpSpPr>
+        <a:xfrm>
+          <a:off x="0" y="0"/>
+          <a:ext cx="0" cy="0"/>
+          <a:chOff x="0" y="0"/>
+          <a:chExt cx="0" cy="0"/>
+        </a:xfrm>
+      </p:grpSpPr>
+      <p:sp>
+        <p:nvSpPr>
+          <p:cNvPr id="2" name="Titel 1">
+            <a:extLst>
+              <a:ext uri="{FF2B5EF4-FFF2-40B4-BE49-F238E27FC236}">
+                <a16:creationId xmlns:a16="http://schemas.microsoft.com/office/drawing/2014/main" id="{9D5F449A-3909-D382-E07E-A906796F9539}"/>
+              </a:ext>
+            </a:extLst>
+          </p:cNvPr>
+          <p:cNvSpPr>
+            <a:spLocks noGrp="1"/>
+          </p:cNvSpPr>
+          <p:nvPr>
+            <p:ph type="title"/>
+          </p:nvPr>
+        </p:nvSpPr>
+        <p:spPr/>
+        <p:txBody>
+          <a:bodyPr/>
+          <a:lstStyle/>
+          <a:p>
+            <a:r>
+              <a:rPr lang="de-DE" dirty="0" err="1"/>
+              <a:t>Contribution</a:t>
+            </a:r>
+            <a:endParaRPr lang="de-DE" dirty="0"/>
+          </a:p>
+        </p:txBody>
+      </p:sp>
+      <p:pic>
+        <p:nvPicPr>
+          <p:cNvPr id="12" name="Inhaltsplatzhalter 11">
+            <a:extLst>
+              <a:ext uri="{FF2B5EF4-FFF2-40B4-BE49-F238E27FC236}">
+                <a16:creationId xmlns:a16="http://schemas.microsoft.com/office/drawing/2014/main" id="{E12C81E7-E58E-5721-8F56-FF9C15C037C6}"/>
+              </a:ext>
+            </a:extLst>
+          </p:cNvPr>
+          <p:cNvPicPr>
+            <a:picLocks noGrp="1" noChangeAspect="1"/>
+          </p:cNvPicPr>
+          <p:nvPr>
+            <p:ph sz="half" idx="2"/>
+          </p:nvPr>
+        </p:nvPicPr>
+        <p:blipFill>
+          <a:blip r:embed="rId2"/>
+          <a:stretch>
+            <a:fillRect/>
+          </a:stretch>
+        </p:blipFill>
+        <p:spPr>
+          <a:xfrm>
+            <a:off x="6172200" y="2258376"/>
+            <a:ext cx="5645150" cy="2925448"/>
+          </a:xfrm>
+        </p:spPr>
+      </p:pic>
+      <p:sp>
+        <p:nvSpPr>
+          <p:cNvPr id="5" name="Fußzeilenplatzhalter 4">
+            <a:extLst>
+              <a:ext uri="{FF2B5EF4-FFF2-40B4-BE49-F238E27FC236}">
+                <a16:creationId xmlns:a16="http://schemas.microsoft.com/office/drawing/2014/main" id="{526A844D-14A0-4735-EBE6-7A1A14BCD8B4}"/>
+              </a:ext>
+            </a:extLst>
+          </p:cNvPr>
+          <p:cNvSpPr>
+            <a:spLocks noGrp="1"/>
+          </p:cNvSpPr>
+          <p:nvPr>
+            <p:ph type="ftr" sz="quarter" idx="11"/>
+          </p:nvPr>
+        </p:nvSpPr>
+        <p:spPr/>
+        <p:txBody>
+          <a:bodyPr/>
+          <a:lstStyle/>
+          <a:p>
+            <a:r>
+              <a:rPr lang="en-US"/>
+              <a:t>Final Product Presentation - LearnStack - DevBallers</a:t>
+            </a:r>
+            <a:endParaRPr lang="en-US" dirty="0"/>
+          </a:p>
+        </p:txBody>
+      </p:sp>
+      <p:sp>
+        <p:nvSpPr>
+          <p:cNvPr id="6" name="Foliennummernplatzhalter 5">
+            <a:extLst>
+              <a:ext uri="{FF2B5EF4-FFF2-40B4-BE49-F238E27FC236}">
+                <a16:creationId xmlns:a16="http://schemas.microsoft.com/office/drawing/2014/main" id="{978BAEC8-9065-56B8-3FB6-52965127016F}"/>
+              </a:ext>
+            </a:extLst>
+          </p:cNvPr>
+          <p:cNvSpPr>
+            <a:spLocks noGrp="1"/>
+          </p:cNvSpPr>
+          <p:nvPr>
+            <p:ph type="sldNum" sz="quarter" idx="12"/>
+          </p:nvPr>
+        </p:nvSpPr>
+        <p:spPr/>
+        <p:txBody>
+          <a:bodyPr/>
+          <a:lstStyle/>
+          <a:p>
+            <a:fld id="{E32A53FC-A1F5-4D9E-915D-C1AF2CE43DED}" type="slidenum">
+              <a:rPr lang="en-US" smtClean="0"/>
+              <a:t>5</a:t>
+            </a:fld>
+            <a:endParaRPr lang="en-US"/>
+          </a:p>
+        </p:txBody>
+      </p:sp>
+      <p:sp>
+        <p:nvSpPr>
+          <p:cNvPr id="10" name="Inhaltsplatzhalter 9">
+            <a:extLst>
+              <a:ext uri="{FF2B5EF4-FFF2-40B4-BE49-F238E27FC236}">
+                <a16:creationId xmlns:a16="http://schemas.microsoft.com/office/drawing/2014/main" id="{F78EA477-7C4B-2C42-B30E-17633B288104}"/>
+              </a:ext>
+            </a:extLst>
+          </p:cNvPr>
+          <p:cNvSpPr>
+            <a:spLocks noGrp="1"/>
+          </p:cNvSpPr>
+          <p:nvPr>
+            <p:ph sz="half" idx="1"/>
+          </p:nvPr>
+        </p:nvSpPr>
+        <p:spPr/>
+        <p:txBody>
+          <a:bodyPr/>
+          <a:lstStyle/>
+          <a:p>
+            <a:r>
+              <a:rPr lang="de-DE" dirty="0" err="1"/>
+              <a:t>Andrit</a:t>
+            </a:r>
+            <a:r>
+              <a:rPr lang="de-DE" dirty="0"/>
+              <a:t> </a:t>
+            </a:r>
+            <a:r>
+              <a:rPr lang="de-DE" dirty="0" err="1"/>
+              <a:t>Hashani</a:t>
+            </a:r>
+            <a:endParaRPr lang="de-DE" dirty="0"/>
+          </a:p>
+          <a:p>
+            <a:pPr lvl="1"/>
+            <a:r>
+              <a:rPr lang="de-DE" dirty="0"/>
+              <a:t>Authentication</a:t>
+            </a:r>
+          </a:p>
+          <a:p>
+            <a:r>
+              <a:rPr lang="de-DE" dirty="0"/>
+              <a:t>Oguzhan Kaluk</a:t>
+            </a:r>
+          </a:p>
+          <a:p>
+            <a:pPr lvl="1"/>
+            <a:r>
+              <a:rPr lang="de-DE" dirty="0"/>
+              <a:t>Stacks and Cards</a:t>
+            </a:r>
+          </a:p>
+          <a:p>
+            <a:pPr lvl="1"/>
+            <a:r>
+              <a:rPr lang="de-DE" dirty="0"/>
+              <a:t>Training-Session</a:t>
+            </a:r>
+          </a:p>
+          <a:p>
+            <a:pPr lvl="2"/>
+            <a:r>
+              <a:rPr lang="de-DE" dirty="0" err="1"/>
+              <a:t>preliminary</a:t>
+            </a:r>
+            <a:r>
+              <a:rPr lang="de-DE" dirty="0"/>
+              <a:t> </a:t>
+            </a:r>
+            <a:r>
+              <a:rPr lang="de-DE" dirty="0" err="1"/>
+              <a:t>work</a:t>
+            </a:r>
+            <a:r>
+              <a:rPr lang="de-DE" dirty="0"/>
+              <a:t> </a:t>
+            </a:r>
+            <a:r>
+              <a:rPr lang="de-DE" dirty="0" err="1"/>
+              <a:t>by</a:t>
+            </a:r>
+            <a:r>
+              <a:rPr lang="de-DE" dirty="0"/>
+              <a:t> Nick Waldschmidt</a:t>
+            </a:r>
+          </a:p>
+          <a:p>
+            <a:pPr lvl="1"/>
+            <a:r>
+              <a:rPr lang="de-DE" dirty="0"/>
+              <a:t>Dashboard</a:t>
+            </a:r>
+          </a:p>
+          <a:p>
+            <a:pPr lvl="1"/>
+            <a:r>
+              <a:rPr lang="de-DE" dirty="0"/>
+              <a:t>Project </a:t>
+            </a:r>
+            <a:r>
+              <a:rPr lang="de-DE" dirty="0" err="1"/>
+              <a:t>Initialization</a:t>
+            </a:r>
+            <a:endParaRPr lang="de-DE" dirty="0"/>
+          </a:p>
+          <a:p>
+            <a:r>
+              <a:rPr lang="de-DE" dirty="0"/>
+              <a:t>Atilla Dogan</a:t>
+            </a:r>
+          </a:p>
+          <a:p>
+            <a:pPr lvl="1"/>
+            <a:r>
+              <a:rPr lang="de-DE" dirty="0"/>
+              <a:t>Forum</a:t>
+            </a:r>
+          </a:p>
+          <a:p>
+            <a:pPr lvl="1"/>
+            <a:endParaRPr lang="de-DE" dirty="0"/>
+          </a:p>
+          <a:p>
+            <a:pPr lvl="1"/>
+            <a:endParaRPr lang="de-DE" dirty="0"/>
+          </a:p>
+        </p:txBody>
+      </p:sp>
+    </p:spTree>
+    <p:extLst>
+      <p:ext uri="{BB962C8B-B14F-4D97-AF65-F5344CB8AC3E}">
+        <p14:creationId xmlns:p14="http://schemas.microsoft.com/office/powerpoint/2010/main" val="266160517"/>
+      </p:ext>
+    </p:extLst>
+  </p:cSld>
+  <p:clrMapOvr>
+    <a:masterClrMapping/>
+  </p:clrMapOvr>
+</p:sld>
+</file>
+
+<file path=ppt/slides/slide6.xml><?xml version="1.0" encoding="utf-8"?>
+<p:sld xmlns:a="http://schemas.openxmlformats.org/drawingml/2006/main" xmlns:r="http://schemas.openxmlformats.org/officeDocument/2006/relationships" xmlns:p="http://schemas.openxmlformats.org/presentationml/2006/main">
+  <p:cSld>
+    <p:spTree>
+      <p:nvGrpSpPr>
+        <p:cNvPr id="1" name=""/>
+        <p:cNvGrpSpPr/>
+        <p:nvPr/>
+      </p:nvGrpSpPr>
+      <p:grpSpPr>
+        <a:xfrm>
+          <a:off x="0" y="0"/>
+          <a:ext cx="0" cy="0"/>
+          <a:chOff x="0" y="0"/>
+          <a:chExt cx="0" cy="0"/>
+        </a:xfrm>
+      </p:grpSpPr>
+      <p:sp>
+        <p:nvSpPr>
+          <p:cNvPr id="2" name="Titel 1">
+            <a:extLst>
+              <a:ext uri="{FF2B5EF4-FFF2-40B4-BE49-F238E27FC236}">
+                <a16:creationId xmlns:a16="http://schemas.microsoft.com/office/drawing/2014/main" id="{4A2E3BEA-71FC-7E07-5808-B58CB8AE261C}"/>
+              </a:ext>
+            </a:extLst>
+          </p:cNvPr>
+          <p:cNvSpPr>
+            <a:spLocks noGrp="1"/>
+          </p:cNvSpPr>
+          <p:nvPr>
+            <p:ph type="title"/>
+          </p:nvPr>
+        </p:nvSpPr>
+        <p:spPr/>
+        <p:txBody>
+          <a:bodyPr/>
+          <a:lstStyle/>
+          <a:p>
+            <a:r>
+              <a:rPr lang="de-DE" dirty="0"/>
+              <a:t>Live Demo</a:t>
+            </a:r>
+          </a:p>
+        </p:txBody>
+      </p:sp>
+      <p:sp>
+        <p:nvSpPr>
+          <p:cNvPr id="7" name="Inhaltsplatzhalter 6">
+            <a:extLst>
+              <a:ext uri="{FF2B5EF4-FFF2-40B4-BE49-F238E27FC236}">
+                <a16:creationId xmlns:a16="http://schemas.microsoft.com/office/drawing/2014/main" id="{53C8BE57-7BDA-C9F0-6EE5-C75F73B30BB3}"/>
+              </a:ext>
+            </a:extLst>
+          </p:cNvPr>
+          <p:cNvSpPr>
+            <a:spLocks noGrp="1"/>
+          </p:cNvSpPr>
+          <p:nvPr>
+            <p:ph idx="1"/>
+          </p:nvPr>
+        </p:nvSpPr>
+        <p:spPr/>
+        <p:txBody>
+          <a:bodyPr anchor="ctr"/>
+          <a:lstStyle/>
+          <a:p>
+            <a:pPr marL="0" indent="0" algn="ctr">
+              <a:buNone/>
+            </a:pPr>
+            <a:r>
+              <a:rPr lang="de-DE" dirty="0"/>
+              <a:t>LIVE DEMO</a:t>
+            </a:r>
+          </a:p>
+        </p:txBody>
+      </p:sp>
+      <p:sp>
+        <p:nvSpPr>
+          <p:cNvPr id="5" name="Fußzeilenplatzhalter 4">
+            <a:extLst>
+              <a:ext uri="{FF2B5EF4-FFF2-40B4-BE49-F238E27FC236}">
+                <a16:creationId xmlns:a16="http://schemas.microsoft.com/office/drawing/2014/main" id="{66A4BED5-EA83-D2E1-E7F4-8CCEDA90D482}"/>
+              </a:ext>
+            </a:extLst>
+          </p:cNvPr>
+          <p:cNvSpPr>
+            <a:spLocks noGrp="1"/>
+          </p:cNvSpPr>
+          <p:nvPr>
+            <p:ph type="ftr" sz="quarter" idx="11"/>
+          </p:nvPr>
+        </p:nvSpPr>
+        <p:spPr/>
+        <p:txBody>
+          <a:bodyPr/>
+          <a:lstStyle/>
+          <a:p>
+            <a:r>
+              <a:rPr lang="en-US"/>
+              <a:t>Final Product Presentation - LearnStack - DevBallers</a:t>
+            </a:r>
+            <a:endParaRPr lang="en-US" dirty="0"/>
+          </a:p>
+        </p:txBody>
+      </p:sp>
+      <p:sp>
+        <p:nvSpPr>
+          <p:cNvPr id="6" name="Foliennummernplatzhalter 5">
+            <a:extLst>
+              <a:ext uri="{FF2B5EF4-FFF2-40B4-BE49-F238E27FC236}">
+                <a16:creationId xmlns:a16="http://schemas.microsoft.com/office/drawing/2014/main" id="{1ABEF7C2-AF49-1B55-D32B-A0DC225989E8}"/>
+              </a:ext>
+            </a:extLst>
+          </p:cNvPr>
+          <p:cNvSpPr>
+            <a:spLocks noGrp="1"/>
+          </p:cNvSpPr>
+          <p:nvPr>
+            <p:ph type="sldNum" sz="quarter" idx="12"/>
+          </p:nvPr>
+        </p:nvSpPr>
+        <p:spPr/>
+        <p:txBody>
+          <a:bodyPr/>
+          <a:lstStyle/>
+          <a:p>
+            <a:fld id="{E32A53FC-A1F5-4D9E-915D-C1AF2CE43DED}" type="slidenum">
+              <a:rPr lang="en-US" smtClean="0"/>
+              <a:t>6</a:t>
+            </a:fld>
+            <a:endParaRPr lang="en-US"/>
+          </a:p>
+        </p:txBody>
+      </p:sp>
+    </p:spTree>
+    <p:extLst>
+      <p:ext uri="{BB962C8B-B14F-4D97-AF65-F5344CB8AC3E}">
+        <p14:creationId xmlns:p14="http://schemas.microsoft.com/office/powerpoint/2010/main" val="1692471795"/>
       </p:ext>
     </p:extLst>
   </p:cSld>

</xml_diff>